<commit_message>
page de titre git avancee
</commit_message>
<xml_diff>
--- a/Formation Git - avancée.pptx
+++ b/Formation Git - avancée.pptx
@@ -5,52 +5,53 @@
     <p:sldMasterId id="2147483660" r:id="rId1"/>
   </p:sldMasterIdLst>
   <p:notesMasterIdLst>
-    <p:notesMasterId r:id="rId42"/>
+    <p:notesMasterId r:id="rId43"/>
   </p:notesMasterIdLst>
   <p:handoutMasterIdLst>
-    <p:handoutMasterId r:id="rId43"/>
+    <p:handoutMasterId r:id="rId44"/>
   </p:handoutMasterIdLst>
   <p:sldIdLst>
-    <p:sldId id="283" r:id="rId2"/>
-    <p:sldId id="284" r:id="rId3"/>
-    <p:sldId id="285" r:id="rId4"/>
-    <p:sldId id="286" r:id="rId5"/>
-    <p:sldId id="287" r:id="rId6"/>
-    <p:sldId id="288" r:id="rId7"/>
-    <p:sldId id="289" r:id="rId8"/>
-    <p:sldId id="290" r:id="rId9"/>
-    <p:sldId id="291" r:id="rId10"/>
-    <p:sldId id="292" r:id="rId11"/>
-    <p:sldId id="293" r:id="rId12"/>
-    <p:sldId id="294" r:id="rId13"/>
-    <p:sldId id="295" r:id="rId14"/>
-    <p:sldId id="296" r:id="rId15"/>
-    <p:sldId id="297" r:id="rId16"/>
-    <p:sldId id="298" r:id="rId17"/>
-    <p:sldId id="257" r:id="rId18"/>
-    <p:sldId id="258" r:id="rId19"/>
-    <p:sldId id="259" r:id="rId20"/>
-    <p:sldId id="261" r:id="rId21"/>
-    <p:sldId id="262" r:id="rId22"/>
-    <p:sldId id="263" r:id="rId23"/>
-    <p:sldId id="264" r:id="rId24"/>
-    <p:sldId id="265" r:id="rId25"/>
-    <p:sldId id="266" r:id="rId26"/>
-    <p:sldId id="267" r:id="rId27"/>
-    <p:sldId id="268" r:id="rId28"/>
-    <p:sldId id="269" r:id="rId29"/>
-    <p:sldId id="270" r:id="rId30"/>
-    <p:sldId id="272" r:id="rId31"/>
-    <p:sldId id="274" r:id="rId32"/>
-    <p:sldId id="275" r:id="rId33"/>
-    <p:sldId id="276" r:id="rId34"/>
-    <p:sldId id="277" r:id="rId35"/>
-    <p:sldId id="278" r:id="rId36"/>
-    <p:sldId id="273" r:id="rId37"/>
-    <p:sldId id="280" r:id="rId38"/>
-    <p:sldId id="279" r:id="rId39"/>
-    <p:sldId id="281" r:id="rId40"/>
-    <p:sldId id="282" r:id="rId41"/>
+    <p:sldId id="300" r:id="rId2"/>
+    <p:sldId id="283" r:id="rId3"/>
+    <p:sldId id="284" r:id="rId4"/>
+    <p:sldId id="285" r:id="rId5"/>
+    <p:sldId id="286" r:id="rId6"/>
+    <p:sldId id="287" r:id="rId7"/>
+    <p:sldId id="288" r:id="rId8"/>
+    <p:sldId id="289" r:id="rId9"/>
+    <p:sldId id="290" r:id="rId10"/>
+    <p:sldId id="291" r:id="rId11"/>
+    <p:sldId id="292" r:id="rId12"/>
+    <p:sldId id="293" r:id="rId13"/>
+    <p:sldId id="294" r:id="rId14"/>
+    <p:sldId id="295" r:id="rId15"/>
+    <p:sldId id="296" r:id="rId16"/>
+    <p:sldId id="297" r:id="rId17"/>
+    <p:sldId id="298" r:id="rId18"/>
+    <p:sldId id="257" r:id="rId19"/>
+    <p:sldId id="258" r:id="rId20"/>
+    <p:sldId id="259" r:id="rId21"/>
+    <p:sldId id="261" r:id="rId22"/>
+    <p:sldId id="262" r:id="rId23"/>
+    <p:sldId id="263" r:id="rId24"/>
+    <p:sldId id="264" r:id="rId25"/>
+    <p:sldId id="265" r:id="rId26"/>
+    <p:sldId id="266" r:id="rId27"/>
+    <p:sldId id="267" r:id="rId28"/>
+    <p:sldId id="268" r:id="rId29"/>
+    <p:sldId id="269" r:id="rId30"/>
+    <p:sldId id="270" r:id="rId31"/>
+    <p:sldId id="272" r:id="rId32"/>
+    <p:sldId id="274" r:id="rId33"/>
+    <p:sldId id="275" r:id="rId34"/>
+    <p:sldId id="276" r:id="rId35"/>
+    <p:sldId id="277" r:id="rId36"/>
+    <p:sldId id="278" r:id="rId37"/>
+    <p:sldId id="273" r:id="rId38"/>
+    <p:sldId id="280" r:id="rId39"/>
+    <p:sldId id="279" r:id="rId40"/>
+    <p:sldId id="281" r:id="rId41"/>
+    <p:sldId id="282" r:id="rId42"/>
   </p:sldIdLst>
   <p:sldSz cx="12192000" cy="6858000"/>
   <p:notesSz cx="6858000" cy="9144000"/>
@@ -13137,50 +13138,30 @@
         </p:nvSpPr>
         <p:spPr/>
         <p:txBody>
-          <a:bodyPr/>
+          <a:bodyPr>
+            <a:normAutofit fontScale="90000"/>
+          </a:bodyPr>
           <a:lstStyle/>
           <a:p>
             <a:r>
-              <a:rPr lang="fr-FR" dirty="0" smtClean="0"/>
-              <a:t>Git sous le capot</a:t>
+              <a:rPr lang="fr-CH" b="1" dirty="0"/>
+              <a:t>Formation git - avancé</a:t>
+            </a:r>
+            <a:br>
+              <a:rPr lang="fr-CH" b="1" dirty="0"/>
+            </a:br>
+            <a:r>
+              <a:rPr lang="fr-CH" dirty="0"/>
+              <a:t>Comprendre git pour l’utiliser encore mieux tous les jours</a:t>
             </a:r>
             <a:endParaRPr lang="fr-CH" dirty="0"/>
           </a:p>
         </p:txBody>
       </p:sp>
-      <p:pic>
-        <p:nvPicPr>
-          <p:cNvPr id="5" name="Espace réservé du contenu 4"/>
-          <p:cNvPicPr>
-            <a:picLocks noGrp="1" noChangeAspect="1"/>
-          </p:cNvPicPr>
-          <p:nvPr>
-            <p:ph idx="1"/>
-          </p:nvPr>
-        </p:nvPicPr>
-        <p:blipFill>
-          <a:blip r:embed="rId2">
-            <a:extLst>
-              <a:ext uri="{28A0092B-C50C-407E-A947-70E740481C1C}">
-                <a14:useLocalDpi xmlns:a14="http://schemas.microsoft.com/office/drawing/2010/main" val="0"/>
-              </a:ext>
-            </a:extLst>
-          </a:blip>
-          <a:stretch>
-            <a:fillRect/>
-          </a:stretch>
-        </p:blipFill>
-        <p:spPr>
-          <a:xfrm>
-            <a:off x="2511846" y="1235678"/>
-            <a:ext cx="6984694" cy="5238520"/>
-          </a:xfrm>
-        </p:spPr>
-      </p:pic>
     </p:spTree>
     <p:extLst>
       <p:ext uri="{BB962C8B-B14F-4D97-AF65-F5344CB8AC3E}">
-        <p14:creationId xmlns:p14="http://schemas.microsoft.com/office/powerpoint/2010/main" val="286723226"/>
+        <p14:creationId xmlns:p14="http://schemas.microsoft.com/office/powerpoint/2010/main" val="2301295919"/>
       </p:ext>
     </p:extLst>
   </p:cSld>
@@ -13191,6 +13172,227 @@
 </file>
 
 <file path=ppt/slides/slide10.xml><?xml version="1.0" encoding="utf-8"?>
+<p:sld xmlns:a="http://schemas.openxmlformats.org/drawingml/2006/main" xmlns:r="http://schemas.openxmlformats.org/officeDocument/2006/relationships" xmlns:p="http://schemas.openxmlformats.org/presentationml/2006/main">
+  <p:cSld>
+    <p:spTree>
+      <p:nvGrpSpPr>
+        <p:cNvPr id="1" name=""/>
+        <p:cNvGrpSpPr/>
+        <p:nvPr/>
+      </p:nvGrpSpPr>
+      <p:grpSpPr>
+        <a:xfrm>
+          <a:off x="0" y="0"/>
+          <a:ext cx="0" cy="0"/>
+          <a:chOff x="0" y="0"/>
+          <a:chExt cx="0" cy="0"/>
+        </a:xfrm>
+      </p:grpSpPr>
+      <p:sp>
+        <p:nvSpPr>
+          <p:cNvPr id="2" name="Titre 1"/>
+          <p:cNvSpPr>
+            <a:spLocks noGrp="1"/>
+          </p:cNvSpPr>
+          <p:nvPr>
+            <p:ph type="title"/>
+          </p:nvPr>
+        </p:nvSpPr>
+        <p:spPr/>
+        <p:txBody>
+          <a:bodyPr/>
+          <a:lstStyle/>
+          <a:p>
+            <a:r>
+              <a:rPr lang="fr-FR" dirty="0" smtClean="0"/>
+              <a:t>Rapatrier les </a:t>
+            </a:r>
+            <a:r>
+              <a:rPr lang="fr-FR" dirty="0" err="1" smtClean="0"/>
+              <a:t>commits</a:t>
+            </a:r>
+            <a:r>
+              <a:rPr lang="fr-FR" dirty="0" smtClean="0"/>
+              <a:t> distants avec le </a:t>
+            </a:r>
+            <a:r>
+              <a:rPr lang="fr-FR" dirty="0" err="1" smtClean="0"/>
+              <a:t>rebase</a:t>
+            </a:r>
+            <a:endParaRPr lang="fr-CH" dirty="0"/>
+          </a:p>
+        </p:txBody>
+      </p:sp>
+      <p:sp>
+        <p:nvSpPr>
+          <p:cNvPr id="3" name="Espace réservé du contenu 2"/>
+          <p:cNvSpPr>
+            <a:spLocks noGrp="1"/>
+          </p:cNvSpPr>
+          <p:nvPr>
+            <p:ph idx="1"/>
+          </p:nvPr>
+        </p:nvSpPr>
+        <p:spPr/>
+        <p:txBody>
+          <a:bodyPr/>
+          <a:lstStyle/>
+          <a:p>
+            <a:r>
+              <a:rPr lang="fr-FR" dirty="0" smtClean="0"/>
+              <a:t>Mettre à jour ma branche locale avec un </a:t>
+            </a:r>
+            <a:r>
+              <a:rPr lang="fr-FR" dirty="0" err="1" smtClean="0"/>
+              <a:t>rebase</a:t>
+            </a:r>
+            <a:endParaRPr lang="fr-FR" dirty="0" smtClean="0"/>
+          </a:p>
+          <a:p>
+            <a:pPr lvl="1"/>
+            <a:r>
+              <a:rPr lang="fr-FR" dirty="0" smtClean="0"/>
+              <a:t>git </a:t>
+            </a:r>
+            <a:r>
+              <a:rPr lang="fr-FR" dirty="0" err="1" smtClean="0"/>
+              <a:t>checkout</a:t>
+            </a:r>
+            <a:r>
+              <a:rPr lang="fr-FR" dirty="0" smtClean="0"/>
+              <a:t> </a:t>
+            </a:r>
+            <a:r>
+              <a:rPr lang="fr-FR" dirty="0" err="1" smtClean="0"/>
+              <a:t>mabranche</a:t>
+            </a:r>
+            <a:r>
+              <a:rPr lang="fr-FR" dirty="0" smtClean="0"/>
+              <a:t> </a:t>
+            </a:r>
+          </a:p>
+          <a:p>
+            <a:pPr lvl="1"/>
+            <a:r>
+              <a:rPr lang="fr-FR" dirty="0"/>
+              <a:t>g</a:t>
+            </a:r>
+            <a:r>
+              <a:rPr lang="fr-FR" dirty="0" smtClean="0"/>
+              <a:t>it </a:t>
+            </a:r>
+            <a:r>
+              <a:rPr lang="fr-FR" dirty="0" err="1" smtClean="0"/>
+              <a:t>fetch</a:t>
+            </a:r>
+            <a:endParaRPr lang="fr-FR" dirty="0" smtClean="0"/>
+          </a:p>
+          <a:p>
+            <a:pPr lvl="1"/>
+            <a:r>
+              <a:rPr lang="fr-FR" dirty="0" smtClean="0"/>
+              <a:t>git </a:t>
+            </a:r>
+            <a:r>
+              <a:rPr lang="fr-FR" dirty="0" err="1" smtClean="0"/>
+              <a:t>rebase</a:t>
+            </a:r>
+            <a:r>
+              <a:rPr lang="fr-FR" dirty="0" smtClean="0"/>
+              <a:t> </a:t>
+            </a:r>
+            <a:r>
+              <a:rPr lang="fr-FR" dirty="0" err="1" smtClean="0"/>
+              <a:t>origin</a:t>
+            </a:r>
+            <a:r>
+              <a:rPr lang="fr-FR" dirty="0" smtClean="0"/>
+              <a:t> </a:t>
+            </a:r>
+            <a:r>
+              <a:rPr lang="fr-FR" dirty="0" err="1" smtClean="0"/>
+              <a:t>mabranche</a:t>
+            </a:r>
+            <a:endParaRPr lang="fr-FR" dirty="0" smtClean="0"/>
+          </a:p>
+          <a:p>
+            <a:pPr lvl="1"/>
+            <a:r>
+              <a:rPr lang="fr-FR" dirty="0" smtClean="0"/>
+              <a:t>En une commande: git pull --</a:t>
+            </a:r>
+            <a:r>
+              <a:rPr lang="fr-FR" dirty="0" err="1" smtClean="0"/>
+              <a:t>rebase</a:t>
+            </a:r>
+            <a:r>
+              <a:rPr lang="fr-FR" dirty="0" smtClean="0"/>
+              <a:t> </a:t>
+            </a:r>
+            <a:r>
+              <a:rPr lang="fr-FR" dirty="0" err="1" smtClean="0"/>
+              <a:t>origin</a:t>
+            </a:r>
+            <a:r>
+              <a:rPr lang="fr-FR" dirty="0" smtClean="0"/>
+              <a:t> </a:t>
+            </a:r>
+            <a:r>
+              <a:rPr lang="fr-FR" dirty="0" err="1" smtClean="0"/>
+              <a:t>mabranche</a:t>
+            </a:r>
+            <a:endParaRPr lang="fr-FR" dirty="0" smtClean="0"/>
+          </a:p>
+          <a:p>
+            <a:r>
+              <a:rPr lang="fr-FR" dirty="0" smtClean="0"/>
+              <a:t>Pas de réécriture de l’histoire</a:t>
+            </a:r>
+          </a:p>
+          <a:p>
+            <a:pPr lvl="1"/>
+            <a:r>
+              <a:rPr lang="fr-FR" dirty="0"/>
+              <a:t>g</a:t>
+            </a:r>
+            <a:r>
+              <a:rPr lang="fr-FR" dirty="0" smtClean="0"/>
+              <a:t>it push </a:t>
+            </a:r>
+            <a:r>
+              <a:rPr lang="fr-FR" dirty="0" err="1" smtClean="0"/>
+              <a:t>origin</a:t>
+            </a:r>
+            <a:r>
+              <a:rPr lang="fr-FR" dirty="0" smtClean="0"/>
+              <a:t> </a:t>
+            </a:r>
+            <a:r>
+              <a:rPr lang="fr-FR" dirty="0" err="1" smtClean="0"/>
+              <a:t>mabranche</a:t>
+            </a:r>
+            <a:endParaRPr lang="fr-FR" dirty="0" smtClean="0"/>
+          </a:p>
+          <a:p>
+            <a:pPr lvl="1"/>
+            <a:endParaRPr lang="fr-CH" dirty="0"/>
+          </a:p>
+        </p:txBody>
+      </p:sp>
+    </p:spTree>
+    <p:extLst>
+      <p:ext uri="{BB962C8B-B14F-4D97-AF65-F5344CB8AC3E}">
+        <p14:creationId xmlns:p14="http://schemas.microsoft.com/office/powerpoint/2010/main" val="1478987373"/>
+      </p:ext>
+    </p:extLst>
+  </p:cSld>
+  <p:clrMapOvr>
+    <a:masterClrMapping/>
+  </p:clrMapOvr>
+</p:sld>
+</file>
+
+<file path=ppt/slides/slide11.xml><?xml version="1.0" encoding="utf-8"?>
 <p:sld xmlns:a="http://schemas.openxmlformats.org/drawingml/2006/main" xmlns:r="http://schemas.openxmlformats.org/officeDocument/2006/relationships" xmlns:p="http://schemas.openxmlformats.org/presentationml/2006/main">
   <p:cSld>
     <p:spTree>
@@ -13397,7 +13599,7 @@
 </p:sld>
 </file>
 
-<file path=ppt/slides/slide11.xml><?xml version="1.0" encoding="utf-8"?>
+<file path=ppt/slides/slide12.xml><?xml version="1.0" encoding="utf-8"?>
 <p:sld xmlns:a="http://schemas.openxmlformats.org/drawingml/2006/main" xmlns:r="http://schemas.openxmlformats.org/officeDocument/2006/relationships" xmlns:p="http://schemas.openxmlformats.org/presentationml/2006/main">
   <p:cSld>
     <p:spTree>
@@ -13541,7 +13743,7 @@
 </p:sld>
 </file>
 
-<file path=ppt/slides/slide12.xml><?xml version="1.0" encoding="utf-8"?>
+<file path=ppt/slides/slide13.xml><?xml version="1.0" encoding="utf-8"?>
 <p:sld xmlns:a="http://schemas.openxmlformats.org/drawingml/2006/main" xmlns:r="http://schemas.openxmlformats.org/officeDocument/2006/relationships" xmlns:p="http://schemas.openxmlformats.org/presentationml/2006/main">
   <p:cSld>
     <p:spTree>
@@ -13734,7 +13936,7 @@
 </p:sld>
 </file>
 
-<file path=ppt/slides/slide13.xml><?xml version="1.0" encoding="utf-8"?>
+<file path=ppt/slides/slide14.xml><?xml version="1.0" encoding="utf-8"?>
 <p:sld xmlns:a="http://schemas.openxmlformats.org/drawingml/2006/main" xmlns:r="http://schemas.openxmlformats.org/officeDocument/2006/relationships" xmlns:p="http://schemas.openxmlformats.org/presentationml/2006/main">
   <p:cSld>
     <p:spTree>
@@ -13986,7 +14188,7 @@
 </p:sld>
 </file>
 
-<file path=ppt/slides/slide14.xml><?xml version="1.0" encoding="utf-8"?>
+<file path=ppt/slides/slide15.xml><?xml version="1.0" encoding="utf-8"?>
 <p:sld xmlns:a="http://schemas.openxmlformats.org/drawingml/2006/main" xmlns:r="http://schemas.openxmlformats.org/officeDocument/2006/relationships" xmlns:p="http://schemas.openxmlformats.org/presentationml/2006/main">
   <p:cSld>
     <p:spTree>
@@ -14092,7 +14294,7 @@
 </p:sld>
 </file>
 
-<file path=ppt/slides/slide15.xml><?xml version="1.0" encoding="utf-8"?>
+<file path=ppt/slides/slide16.xml><?xml version="1.0" encoding="utf-8"?>
 <p:sld xmlns:a="http://schemas.openxmlformats.org/drawingml/2006/main" xmlns:r="http://schemas.openxmlformats.org/officeDocument/2006/relationships" xmlns:p="http://schemas.openxmlformats.org/presentationml/2006/main">
   <p:cSld>
     <p:spTree>
@@ -14584,7 +14786,7 @@
 </p:sld>
 </file>
 
-<file path=ppt/slides/slide16.xml><?xml version="1.0" encoding="utf-8"?>
+<file path=ppt/slides/slide17.xml><?xml version="1.0" encoding="utf-8"?>
 <p:sld xmlns:a="http://schemas.openxmlformats.org/drawingml/2006/main" xmlns:r="http://schemas.openxmlformats.org/officeDocument/2006/relationships" xmlns:p="http://schemas.openxmlformats.org/presentationml/2006/main">
   <p:cSld>
     <p:spTree>
@@ -14713,7 +14915,7 @@
 </p:sld>
 </file>
 
-<file path=ppt/slides/slide17.xml><?xml version="1.0" encoding="utf-8"?>
+<file path=ppt/slides/slide18.xml><?xml version="1.0" encoding="utf-8"?>
 <p:sld xmlns:a="http://schemas.openxmlformats.org/drawingml/2006/main" xmlns:r="http://schemas.openxmlformats.org/officeDocument/2006/relationships" xmlns:p="http://schemas.openxmlformats.org/presentationml/2006/main">
   <p:cSld>
     <p:spTree>
@@ -14838,7 +15040,7 @@
 </p:sld>
 </file>
 
-<file path=ppt/slides/slide18.xml><?xml version="1.0" encoding="utf-8"?>
+<file path=ppt/slides/slide19.xml><?xml version="1.0" encoding="utf-8"?>
 <p:sld xmlns:a="http://schemas.openxmlformats.org/drawingml/2006/main" xmlns:r="http://schemas.openxmlformats.org/officeDocument/2006/relationships" xmlns:p="http://schemas.openxmlformats.org/presentationml/2006/main">
   <p:cSld>
     <p:spTree>
@@ -15264,225 +15466,6 @@
 </p:sld>
 </file>
 
-<file path=ppt/slides/slide19.xml><?xml version="1.0" encoding="utf-8"?>
-<p:sld xmlns:a="http://schemas.openxmlformats.org/drawingml/2006/main" xmlns:r="http://schemas.openxmlformats.org/officeDocument/2006/relationships" xmlns:p="http://schemas.openxmlformats.org/presentationml/2006/main">
-  <p:cSld>
-    <p:spTree>
-      <p:nvGrpSpPr>
-        <p:cNvPr id="1" name=""/>
-        <p:cNvGrpSpPr/>
-        <p:nvPr/>
-      </p:nvGrpSpPr>
-      <p:grpSpPr>
-        <a:xfrm>
-          <a:off x="0" y="0"/>
-          <a:ext cx="0" cy="0"/>
-          <a:chOff x="0" y="0"/>
-          <a:chExt cx="0" cy="0"/>
-        </a:xfrm>
-      </p:grpSpPr>
-      <p:sp>
-        <p:nvSpPr>
-          <p:cNvPr id="2" name="Titre 1"/>
-          <p:cNvSpPr>
-            <a:spLocks noGrp="1"/>
-          </p:cNvSpPr>
-          <p:nvPr>
-            <p:ph type="title"/>
-          </p:nvPr>
-        </p:nvSpPr>
-        <p:spPr/>
-        <p:txBody>
-          <a:bodyPr/>
-          <a:lstStyle/>
-          <a:p>
-            <a:r>
-              <a:rPr lang="fr-CH" dirty="0" smtClean="0"/>
-              <a:t>git cherry-</a:t>
-            </a:r>
-            <a:r>
-              <a:rPr lang="fr-CH" dirty="0" err="1" smtClean="0"/>
-              <a:t>pick</a:t>
-            </a:r>
-            <a:endParaRPr lang="fr-CH" dirty="0"/>
-          </a:p>
-        </p:txBody>
-      </p:sp>
-      <p:sp>
-        <p:nvSpPr>
-          <p:cNvPr id="3" name="Espace réservé du contenu 2"/>
-          <p:cNvSpPr>
-            <a:spLocks noGrp="1"/>
-          </p:cNvSpPr>
-          <p:nvPr>
-            <p:ph idx="1"/>
-          </p:nvPr>
-        </p:nvSpPr>
-        <p:spPr/>
-        <p:txBody>
-          <a:bodyPr/>
-          <a:lstStyle/>
-          <a:p>
-            <a:r>
-              <a:rPr lang="fr-CH" dirty="0" smtClean="0"/>
-              <a:t>Se positionner sur le master du dépôt page-web-participative-</a:t>
-            </a:r>
-            <a:r>
-              <a:rPr lang="fr-CH" dirty="0" err="1" smtClean="0"/>
-              <a:t>rebase</a:t>
-            </a:r>
-            <a:endParaRPr lang="fr-CH" dirty="0" smtClean="0"/>
-          </a:p>
-          <a:p>
-            <a:r>
-              <a:rPr lang="fr-CH" dirty="0" smtClean="0"/>
-              <a:t>Faire un cherry-</a:t>
-            </a:r>
-            <a:r>
-              <a:rPr lang="fr-CH" dirty="0" err="1" smtClean="0"/>
-              <a:t>pick</a:t>
-            </a:r>
-            <a:r>
-              <a:rPr lang="fr-CH" dirty="0" smtClean="0"/>
-              <a:t> du commit «commit1» de la </a:t>
-            </a:r>
-            <a:r>
-              <a:rPr lang="fr-CH" dirty="0" err="1" smtClean="0"/>
-              <a:t>feature</a:t>
-            </a:r>
-            <a:r>
-              <a:rPr lang="fr-CH" dirty="0" smtClean="0"/>
-              <a:t> </a:t>
-            </a:r>
-            <a:r>
-              <a:rPr lang="fr-CH" dirty="0" err="1" smtClean="0"/>
-              <a:t>new_button</a:t>
-            </a:r>
-            <a:endParaRPr lang="fr-CH" dirty="0" smtClean="0"/>
-          </a:p>
-          <a:p>
-            <a:r>
-              <a:rPr lang="fr-CH" dirty="0" smtClean="0"/>
-              <a:t>Observer le log et son graphe pour voir l’impact sur le graphe</a:t>
-            </a:r>
-          </a:p>
-          <a:p>
-            <a:pPr lvl="1"/>
-            <a:r>
-              <a:rPr lang="en-US" i="1" dirty="0" err="1"/>
-              <a:t>git</a:t>
-            </a:r>
-            <a:r>
-              <a:rPr lang="en-US" i="1" dirty="0"/>
-              <a:t> log --graph --</a:t>
-            </a:r>
-            <a:r>
-              <a:rPr lang="en-US" i="1" dirty="0" err="1"/>
-              <a:t>oneline</a:t>
-            </a:r>
-            <a:r>
-              <a:rPr lang="en-US" i="1" dirty="0"/>
-              <a:t> --decorate</a:t>
-            </a:r>
-            <a:endParaRPr lang="fr-CH" dirty="0"/>
-          </a:p>
-        </p:txBody>
-      </p:sp>
-      <p:sp>
-        <p:nvSpPr>
-          <p:cNvPr id="5" name="ZoneTexte 4"/>
-          <p:cNvSpPr txBox="1"/>
-          <p:nvPr/>
-        </p:nvSpPr>
-        <p:spPr>
-          <a:xfrm>
-            <a:off x="950384" y="5591174"/>
-            <a:ext cx="8585502" cy="584775"/>
-          </a:xfrm>
-          <a:prstGeom prst="rect">
-            <a:avLst/>
-          </a:prstGeom>
-          <a:solidFill>
-            <a:srgbClr val="D91E4B"/>
-          </a:solidFill>
-        </p:spPr>
-        <p:txBody>
-          <a:bodyPr wrap="square" rtlCol="0">
-            <a:spAutoFit/>
-          </a:bodyPr>
-          <a:lstStyle/>
-          <a:p>
-            <a:r>
-              <a:rPr lang="fr-CH" sz="1600" dirty="0" smtClean="0">
-                <a:solidFill>
-                  <a:schemeClr val="bg1"/>
-                </a:solidFill>
-              </a:rPr>
-              <a:t>Question :</a:t>
-            </a:r>
-          </a:p>
-          <a:p>
-            <a:r>
-              <a:rPr lang="fr-CH" sz="1600" dirty="0" smtClean="0">
-                <a:solidFill>
-                  <a:schemeClr val="bg1"/>
-                </a:solidFill>
-              </a:rPr>
-              <a:t>● </a:t>
-            </a:r>
-            <a:r>
-              <a:rPr lang="fr-CH" sz="1600" dirty="0">
-                <a:solidFill>
-                  <a:schemeClr val="bg1"/>
-                </a:solidFill>
-              </a:rPr>
-              <a:t>Lors de quelles opérations l’usage de cherry-</a:t>
-            </a:r>
-            <a:r>
-              <a:rPr lang="fr-CH" sz="1600" dirty="0" err="1">
-                <a:solidFill>
-                  <a:schemeClr val="bg1"/>
-                </a:solidFill>
-              </a:rPr>
-              <a:t>pick</a:t>
-            </a:r>
-            <a:r>
-              <a:rPr lang="fr-CH" sz="1600" dirty="0">
-                <a:solidFill>
-                  <a:schemeClr val="bg1"/>
-                </a:solidFill>
-              </a:rPr>
-              <a:t> déclenchera des conflits a </a:t>
-            </a:r>
-            <a:r>
-              <a:rPr lang="fr-CH" sz="1600" dirty="0" smtClean="0">
-                <a:solidFill>
-                  <a:schemeClr val="bg1"/>
-                </a:solidFill>
-              </a:rPr>
-              <a:t>posteriori ?</a:t>
-            </a:r>
-            <a:endParaRPr lang="fr-CH" sz="1600" dirty="0">
-              <a:solidFill>
-                <a:schemeClr val="bg1"/>
-              </a:solidFill>
-            </a:endParaRPr>
-          </a:p>
-        </p:txBody>
-      </p:sp>
-    </p:spTree>
-    <p:extLst>
-      <p:ext uri="{BB962C8B-B14F-4D97-AF65-F5344CB8AC3E}">
-        <p14:creationId xmlns:p14="http://schemas.microsoft.com/office/powerpoint/2010/main" val="4235567567"/>
-      </p:ext>
-    </p:extLst>
-  </p:cSld>
-  <p:clrMapOvr>
-    <a:masterClrMapping/>
-  </p:clrMapOvr>
-</p:sld>
-</file>
-
 <file path=ppt/slides/slide2.xml><?xml version="1.0" encoding="utf-8"?>
 <p:sld xmlns:a="http://schemas.openxmlformats.org/drawingml/2006/main" xmlns:r="http://schemas.openxmlformats.org/officeDocument/2006/relationships" xmlns:p="http://schemas.openxmlformats.org/presentationml/2006/main">
   <p:cSld>
@@ -15517,117 +15500,45 @@
           <a:p>
             <a:r>
               <a:rPr lang="fr-FR" dirty="0" smtClean="0"/>
-              <a:t>L’architecture</a:t>
+              <a:t>Git sous le capot</a:t>
             </a:r>
             <a:endParaRPr lang="fr-CH" dirty="0"/>
           </a:p>
         </p:txBody>
       </p:sp>
-      <p:sp>
-        <p:nvSpPr>
-          <p:cNvPr id="3" name="Espace réservé du contenu 2"/>
-          <p:cNvSpPr>
-            <a:spLocks noGrp="1"/>
-          </p:cNvSpPr>
+      <p:pic>
+        <p:nvPicPr>
+          <p:cNvPr id="5" name="Espace réservé du contenu 4"/>
+          <p:cNvPicPr>
+            <a:picLocks noGrp="1" noChangeAspect="1"/>
+          </p:cNvPicPr>
           <p:nvPr>
             <p:ph idx="1"/>
           </p:nvPr>
-        </p:nvSpPr>
+        </p:nvPicPr>
+        <p:blipFill>
+          <a:blip r:embed="rId2">
+            <a:extLst>
+              <a:ext uri="{28A0092B-C50C-407E-A947-70E740481C1C}">
+                <a14:useLocalDpi xmlns:a14="http://schemas.microsoft.com/office/drawing/2010/main" val="0"/>
+              </a:ext>
+            </a:extLst>
+          </a:blip>
+          <a:stretch>
+            <a:fillRect/>
+          </a:stretch>
+        </p:blipFill>
         <p:spPr>
           <a:xfrm>
-            <a:off x="950384" y="1555242"/>
-            <a:ext cx="10281992" cy="3619041"/>
+            <a:off x="2511846" y="1235678"/>
+            <a:ext cx="6984694" cy="5238520"/>
           </a:xfrm>
         </p:spPr>
-        <p:txBody>
-          <a:bodyPr>
-            <a:normAutofit/>
-          </a:bodyPr>
-          <a:lstStyle/>
-          <a:p>
-            <a:r>
-              <a:rPr lang="fr-FR" dirty="0" smtClean="0"/>
-              <a:t>Le répertoire .git contient toutes les informations nécessaire au fonctionnement du </a:t>
-            </a:r>
-            <a:r>
-              <a:rPr lang="fr-FR" dirty="0" err="1" smtClean="0"/>
-              <a:t>dépot</a:t>
-            </a:r>
-            <a:endParaRPr lang="fr-FR" dirty="0" smtClean="0"/>
-          </a:p>
-          <a:p>
-            <a:r>
-              <a:rPr lang="fr-FR" dirty="0" smtClean="0"/>
-              <a:t>Contient les répertoires suivants</a:t>
-            </a:r>
-          </a:p>
-          <a:p>
-            <a:pPr lvl="1"/>
-            <a:r>
-              <a:rPr lang="fr-FR" dirty="0" err="1" smtClean="0"/>
-              <a:t>Hooks</a:t>
-            </a:r>
-            <a:r>
-              <a:rPr lang="fr-FR" dirty="0" smtClean="0"/>
-              <a:t> -&gt; permet de stocker les scripts de </a:t>
-            </a:r>
-            <a:r>
-              <a:rPr lang="fr-FR" dirty="0" err="1" smtClean="0"/>
-              <a:t>hook</a:t>
-            </a:r>
-            <a:endParaRPr lang="fr-FR" dirty="0" smtClean="0"/>
-          </a:p>
-          <a:p>
-            <a:pPr lvl="1"/>
-            <a:r>
-              <a:rPr lang="fr-FR" dirty="0" smtClean="0"/>
-              <a:t>Logs -&gt; logs des différentes opérations effectuées avec git</a:t>
-            </a:r>
-          </a:p>
-          <a:p>
-            <a:pPr lvl="1"/>
-            <a:r>
-              <a:rPr lang="fr-FR" dirty="0" err="1" smtClean="0"/>
-              <a:t>Objects</a:t>
-            </a:r>
-            <a:r>
-              <a:rPr lang="fr-FR" dirty="0" smtClean="0"/>
-              <a:t> -&gt; contient (entre autre) les </a:t>
-            </a:r>
-            <a:r>
-              <a:rPr lang="fr-FR" dirty="0" err="1" smtClean="0"/>
-              <a:t>commits</a:t>
-            </a:r>
-            <a:endParaRPr lang="fr-FR" dirty="0" smtClean="0"/>
-          </a:p>
-          <a:p>
-            <a:pPr lvl="1"/>
-            <a:r>
-              <a:rPr lang="fr-FR" dirty="0" err="1" smtClean="0"/>
-              <a:t>Refs</a:t>
-            </a:r>
-            <a:r>
-              <a:rPr lang="fr-FR" dirty="0" smtClean="0"/>
-              <a:t> -&gt; contient les étiquettes  </a:t>
-            </a:r>
-          </a:p>
-          <a:p>
-            <a:r>
-              <a:rPr lang="fr-CH" dirty="0" smtClean="0"/>
-              <a:t>Le fonctionnement interne de git est basé que sur les </a:t>
-            </a:r>
-            <a:r>
-              <a:rPr lang="fr-CH" dirty="0" err="1" smtClean="0"/>
-              <a:t>objects</a:t>
-            </a:r>
-            <a:endParaRPr lang="fr-FR" dirty="0"/>
-          </a:p>
-        </p:txBody>
-      </p:sp>
+      </p:pic>
     </p:spTree>
     <p:extLst>
       <p:ext uri="{BB962C8B-B14F-4D97-AF65-F5344CB8AC3E}">
-        <p14:creationId xmlns:p14="http://schemas.microsoft.com/office/powerpoint/2010/main" val="3934817676"/>
+        <p14:creationId xmlns:p14="http://schemas.microsoft.com/office/powerpoint/2010/main" val="286723226"/>
       </p:ext>
     </p:extLst>
   </p:cSld>
@@ -15683,6 +15594,225 @@
       </p:sp>
       <p:sp>
         <p:nvSpPr>
+          <p:cNvPr id="3" name="Espace réservé du contenu 2"/>
+          <p:cNvSpPr>
+            <a:spLocks noGrp="1"/>
+          </p:cNvSpPr>
+          <p:nvPr>
+            <p:ph idx="1"/>
+          </p:nvPr>
+        </p:nvSpPr>
+        <p:spPr/>
+        <p:txBody>
+          <a:bodyPr/>
+          <a:lstStyle/>
+          <a:p>
+            <a:r>
+              <a:rPr lang="fr-CH" dirty="0" smtClean="0"/>
+              <a:t>Se positionner sur le master du dépôt page-web-participative-</a:t>
+            </a:r>
+            <a:r>
+              <a:rPr lang="fr-CH" dirty="0" err="1" smtClean="0"/>
+              <a:t>rebase</a:t>
+            </a:r>
+            <a:endParaRPr lang="fr-CH" dirty="0" smtClean="0"/>
+          </a:p>
+          <a:p>
+            <a:r>
+              <a:rPr lang="fr-CH" dirty="0" smtClean="0"/>
+              <a:t>Faire un cherry-</a:t>
+            </a:r>
+            <a:r>
+              <a:rPr lang="fr-CH" dirty="0" err="1" smtClean="0"/>
+              <a:t>pick</a:t>
+            </a:r>
+            <a:r>
+              <a:rPr lang="fr-CH" dirty="0" smtClean="0"/>
+              <a:t> du commit «commit1» de la </a:t>
+            </a:r>
+            <a:r>
+              <a:rPr lang="fr-CH" dirty="0" err="1" smtClean="0"/>
+              <a:t>feature</a:t>
+            </a:r>
+            <a:r>
+              <a:rPr lang="fr-CH" dirty="0" smtClean="0"/>
+              <a:t> </a:t>
+            </a:r>
+            <a:r>
+              <a:rPr lang="fr-CH" dirty="0" err="1" smtClean="0"/>
+              <a:t>new_button</a:t>
+            </a:r>
+            <a:endParaRPr lang="fr-CH" dirty="0" smtClean="0"/>
+          </a:p>
+          <a:p>
+            <a:r>
+              <a:rPr lang="fr-CH" dirty="0" smtClean="0"/>
+              <a:t>Observer le log et son graphe pour voir l’impact sur le graphe</a:t>
+            </a:r>
+          </a:p>
+          <a:p>
+            <a:pPr lvl="1"/>
+            <a:r>
+              <a:rPr lang="en-US" i="1" dirty="0" err="1"/>
+              <a:t>git</a:t>
+            </a:r>
+            <a:r>
+              <a:rPr lang="en-US" i="1" dirty="0"/>
+              <a:t> log --graph --</a:t>
+            </a:r>
+            <a:r>
+              <a:rPr lang="en-US" i="1" dirty="0" err="1"/>
+              <a:t>oneline</a:t>
+            </a:r>
+            <a:r>
+              <a:rPr lang="en-US" i="1" dirty="0"/>
+              <a:t> --decorate</a:t>
+            </a:r>
+            <a:endParaRPr lang="fr-CH" dirty="0"/>
+          </a:p>
+        </p:txBody>
+      </p:sp>
+      <p:sp>
+        <p:nvSpPr>
+          <p:cNvPr id="5" name="ZoneTexte 4"/>
+          <p:cNvSpPr txBox="1"/>
+          <p:nvPr/>
+        </p:nvSpPr>
+        <p:spPr>
+          <a:xfrm>
+            <a:off x="950384" y="5591174"/>
+            <a:ext cx="8585502" cy="584775"/>
+          </a:xfrm>
+          <a:prstGeom prst="rect">
+            <a:avLst/>
+          </a:prstGeom>
+          <a:solidFill>
+            <a:srgbClr val="D91E4B"/>
+          </a:solidFill>
+        </p:spPr>
+        <p:txBody>
+          <a:bodyPr wrap="square" rtlCol="0">
+            <a:spAutoFit/>
+          </a:bodyPr>
+          <a:lstStyle/>
+          <a:p>
+            <a:r>
+              <a:rPr lang="fr-CH" sz="1600" dirty="0" smtClean="0">
+                <a:solidFill>
+                  <a:schemeClr val="bg1"/>
+                </a:solidFill>
+              </a:rPr>
+              <a:t>Question :</a:t>
+            </a:r>
+          </a:p>
+          <a:p>
+            <a:r>
+              <a:rPr lang="fr-CH" sz="1600" dirty="0" smtClean="0">
+                <a:solidFill>
+                  <a:schemeClr val="bg1"/>
+                </a:solidFill>
+              </a:rPr>
+              <a:t>● </a:t>
+            </a:r>
+            <a:r>
+              <a:rPr lang="fr-CH" sz="1600" dirty="0">
+                <a:solidFill>
+                  <a:schemeClr val="bg1"/>
+                </a:solidFill>
+              </a:rPr>
+              <a:t>Lors de quelles opérations l’usage de cherry-</a:t>
+            </a:r>
+            <a:r>
+              <a:rPr lang="fr-CH" sz="1600" dirty="0" err="1">
+                <a:solidFill>
+                  <a:schemeClr val="bg1"/>
+                </a:solidFill>
+              </a:rPr>
+              <a:t>pick</a:t>
+            </a:r>
+            <a:r>
+              <a:rPr lang="fr-CH" sz="1600" dirty="0">
+                <a:solidFill>
+                  <a:schemeClr val="bg1"/>
+                </a:solidFill>
+              </a:rPr>
+              <a:t> déclenchera des conflits a </a:t>
+            </a:r>
+            <a:r>
+              <a:rPr lang="fr-CH" sz="1600" dirty="0" smtClean="0">
+                <a:solidFill>
+                  <a:schemeClr val="bg1"/>
+                </a:solidFill>
+              </a:rPr>
+              <a:t>posteriori ?</a:t>
+            </a:r>
+            <a:endParaRPr lang="fr-CH" sz="1600" dirty="0">
+              <a:solidFill>
+                <a:schemeClr val="bg1"/>
+              </a:solidFill>
+            </a:endParaRPr>
+          </a:p>
+        </p:txBody>
+      </p:sp>
+    </p:spTree>
+    <p:extLst>
+      <p:ext uri="{BB962C8B-B14F-4D97-AF65-F5344CB8AC3E}">
+        <p14:creationId xmlns:p14="http://schemas.microsoft.com/office/powerpoint/2010/main" val="4235567567"/>
+      </p:ext>
+    </p:extLst>
+  </p:cSld>
+  <p:clrMapOvr>
+    <a:masterClrMapping/>
+  </p:clrMapOvr>
+</p:sld>
+</file>
+
+<file path=ppt/slides/slide21.xml><?xml version="1.0" encoding="utf-8"?>
+<p:sld xmlns:a="http://schemas.openxmlformats.org/drawingml/2006/main" xmlns:r="http://schemas.openxmlformats.org/officeDocument/2006/relationships" xmlns:p="http://schemas.openxmlformats.org/presentationml/2006/main">
+  <p:cSld>
+    <p:spTree>
+      <p:nvGrpSpPr>
+        <p:cNvPr id="1" name=""/>
+        <p:cNvGrpSpPr/>
+        <p:nvPr/>
+      </p:nvGrpSpPr>
+      <p:grpSpPr>
+        <a:xfrm>
+          <a:off x="0" y="0"/>
+          <a:ext cx="0" cy="0"/>
+          <a:chOff x="0" y="0"/>
+          <a:chExt cx="0" cy="0"/>
+        </a:xfrm>
+      </p:grpSpPr>
+      <p:sp>
+        <p:nvSpPr>
+          <p:cNvPr id="2" name="Titre 1"/>
+          <p:cNvSpPr>
+            <a:spLocks noGrp="1"/>
+          </p:cNvSpPr>
+          <p:nvPr>
+            <p:ph type="title"/>
+          </p:nvPr>
+        </p:nvSpPr>
+        <p:spPr/>
+        <p:txBody>
+          <a:bodyPr/>
+          <a:lstStyle/>
+          <a:p>
+            <a:r>
+              <a:rPr lang="fr-CH" dirty="0" smtClean="0"/>
+              <a:t>git cherry-</a:t>
+            </a:r>
+            <a:r>
+              <a:rPr lang="fr-CH" dirty="0" err="1" smtClean="0"/>
+              <a:t>pick</a:t>
+            </a:r>
+            <a:endParaRPr lang="fr-CH" dirty="0"/>
+          </a:p>
+        </p:txBody>
+      </p:sp>
+      <p:sp>
+        <p:nvSpPr>
           <p:cNvPr id="5" name="ZoneTexte 4"/>
           <p:cNvSpPr txBox="1"/>
           <p:nvPr/>
@@ -15892,7 +16022,7 @@
 </p:sld>
 </file>
 
-<file path=ppt/slides/slide21.xml><?xml version="1.0" encoding="utf-8"?>
+<file path=ppt/slides/slide22.xml><?xml version="1.0" encoding="utf-8"?>
 <p:sld xmlns:a="http://schemas.openxmlformats.org/drawingml/2006/main" xmlns:r="http://schemas.openxmlformats.org/officeDocument/2006/relationships" xmlns:p="http://schemas.openxmlformats.org/presentationml/2006/main">
   <p:cSld>
     <p:spTree>
@@ -16016,172 +16146,6 @@
 </p:sld>
 </file>
 
-<file path=ppt/slides/slide22.xml><?xml version="1.0" encoding="utf-8"?>
-<p:sld xmlns:a="http://schemas.openxmlformats.org/drawingml/2006/main" xmlns:r="http://schemas.openxmlformats.org/officeDocument/2006/relationships" xmlns:p="http://schemas.openxmlformats.org/presentationml/2006/main">
-  <p:cSld>
-    <p:spTree>
-      <p:nvGrpSpPr>
-        <p:cNvPr id="1" name=""/>
-        <p:cNvGrpSpPr/>
-        <p:nvPr/>
-      </p:nvGrpSpPr>
-      <p:grpSpPr>
-        <a:xfrm>
-          <a:off x="0" y="0"/>
-          <a:ext cx="0" cy="0"/>
-          <a:chOff x="0" y="0"/>
-          <a:chExt cx="0" cy="0"/>
-        </a:xfrm>
-      </p:grpSpPr>
-      <p:sp>
-        <p:nvSpPr>
-          <p:cNvPr id="2" name="Titre 1"/>
-          <p:cNvSpPr>
-            <a:spLocks noGrp="1"/>
-          </p:cNvSpPr>
-          <p:nvPr>
-            <p:ph type="title"/>
-          </p:nvPr>
-        </p:nvSpPr>
-        <p:spPr/>
-        <p:txBody>
-          <a:bodyPr/>
-          <a:lstStyle/>
-          <a:p>
-            <a:r>
-              <a:rPr lang="fr-CH" dirty="0" smtClean="0"/>
-              <a:t>git </a:t>
-            </a:r>
-            <a:r>
-              <a:rPr lang="fr-CH" dirty="0" err="1" smtClean="0"/>
-              <a:t>rebase</a:t>
-            </a:r>
-            <a:r>
-              <a:rPr lang="fr-CH" dirty="0" smtClean="0"/>
-              <a:t> --onto</a:t>
-            </a:r>
-            <a:endParaRPr lang="fr-CH" dirty="0"/>
-          </a:p>
-        </p:txBody>
-      </p:sp>
-      <p:sp>
-        <p:nvSpPr>
-          <p:cNvPr id="3" name="Espace réservé du contenu 2"/>
-          <p:cNvSpPr>
-            <a:spLocks noGrp="1"/>
-          </p:cNvSpPr>
-          <p:nvPr>
-            <p:ph idx="1"/>
-          </p:nvPr>
-        </p:nvSpPr>
-        <p:spPr/>
-        <p:txBody>
-          <a:bodyPr/>
-          <a:lstStyle/>
-          <a:p>
-            <a:r>
-              <a:rPr lang="fr-CH" dirty="0" smtClean="0"/>
-              <a:t>Se positionner sur le master du dépôt page-web-participative-</a:t>
-            </a:r>
-            <a:r>
-              <a:rPr lang="fr-CH" dirty="0" err="1" smtClean="0"/>
-              <a:t>rebase</a:t>
-            </a:r>
-            <a:endParaRPr lang="fr-CH" dirty="0" smtClean="0"/>
-          </a:p>
-          <a:p>
-            <a:r>
-              <a:rPr lang="fr-CH" dirty="0" smtClean="0"/>
-              <a:t>Faire une branche </a:t>
-            </a:r>
-            <a:r>
-              <a:rPr lang="fr-CH" dirty="0" err="1" smtClean="0"/>
-              <a:t>feature-awesome_new_button</a:t>
-            </a:r>
-            <a:r>
-              <a:rPr lang="fr-CH" dirty="0" smtClean="0"/>
-              <a:t> en partant de la branche </a:t>
-            </a:r>
-            <a:r>
-              <a:rPr lang="fr-CH" dirty="0" err="1" smtClean="0"/>
-              <a:t>feature-new_button</a:t>
-            </a:r>
-            <a:endParaRPr lang="fr-CH" dirty="0" smtClean="0"/>
-          </a:p>
-          <a:p>
-            <a:r>
-              <a:rPr lang="fr-CH" dirty="0" smtClean="0"/>
-              <a:t>Faire quelques </a:t>
-            </a:r>
-            <a:r>
-              <a:rPr lang="fr-CH" dirty="0" err="1" smtClean="0"/>
-              <a:t>commits</a:t>
-            </a:r>
-            <a:r>
-              <a:rPr lang="fr-CH" dirty="0"/>
-              <a:t> et </a:t>
-            </a:r>
-            <a:r>
-              <a:rPr lang="fr-CH" dirty="0" smtClean="0"/>
-              <a:t>observer </a:t>
-            </a:r>
-            <a:r>
-              <a:rPr lang="fr-CH" dirty="0"/>
-              <a:t>le log et son graphe</a:t>
-            </a:r>
-            <a:endParaRPr lang="fr-CH" dirty="0" smtClean="0"/>
-          </a:p>
-          <a:p>
-            <a:r>
-              <a:rPr lang="fr-CH" dirty="0" smtClean="0"/>
-              <a:t>Faire en sorte que la branche </a:t>
-            </a:r>
-            <a:r>
-              <a:rPr lang="fr-CH" dirty="0" err="1" smtClean="0"/>
-              <a:t>feature-awesome_new_button</a:t>
-            </a:r>
-            <a:r>
-              <a:rPr lang="fr-CH" dirty="0" smtClean="0"/>
-              <a:t> démarre en fait de master</a:t>
-            </a:r>
-          </a:p>
-          <a:p>
-            <a:r>
-              <a:rPr lang="fr-CH" dirty="0"/>
-              <a:t>Observer le log et son </a:t>
-            </a:r>
-            <a:r>
-              <a:rPr lang="fr-CH" dirty="0" smtClean="0"/>
-              <a:t>graphe et constater l’impact du git </a:t>
-            </a:r>
-            <a:r>
-              <a:rPr lang="fr-CH" dirty="0" err="1" smtClean="0"/>
-              <a:t>rebase</a:t>
-            </a:r>
-            <a:r>
-              <a:rPr lang="fr-CH" dirty="0"/>
-              <a:t> </a:t>
-            </a:r>
-            <a:r>
-              <a:rPr lang="fr-CH" dirty="0" smtClean="0"/>
-              <a:t>--onto</a:t>
-            </a:r>
-          </a:p>
-        </p:txBody>
-      </p:sp>
-    </p:spTree>
-    <p:extLst>
-      <p:ext uri="{BB962C8B-B14F-4D97-AF65-F5344CB8AC3E}">
-        <p14:creationId xmlns:p14="http://schemas.microsoft.com/office/powerpoint/2010/main" val="1393638253"/>
-      </p:ext>
-    </p:extLst>
-  </p:cSld>
-  <p:clrMapOvr>
-    <a:masterClrMapping/>
-  </p:clrMapOvr>
-</p:sld>
-</file>
-
 <file path=ppt/slides/slide23.xml><?xml version="1.0" encoding="utf-8"?>
 <p:sld xmlns:a="http://schemas.openxmlformats.org/drawingml/2006/main" xmlns:r="http://schemas.openxmlformats.org/officeDocument/2006/relationships" xmlns:p="http://schemas.openxmlformats.org/presentationml/2006/main">
   <p:cSld>
@@ -16220,7 +16184,11 @@
             </a:r>
             <a:r>
               <a:rPr lang="fr-CH" dirty="0" err="1" smtClean="0"/>
-              <a:t>bisect</a:t>
+              <a:t>rebase</a:t>
+            </a:r>
+            <a:r>
+              <a:rPr lang="fr-CH" dirty="0" smtClean="0"/>
+              <a:t> --onto</a:t>
             </a:r>
             <a:endParaRPr lang="fr-CH" dirty="0"/>
           </a:p>
@@ -16242,80 +16210,99 @@
           <a:lstStyle/>
           <a:p>
             <a:r>
+              <a:rPr lang="fr-CH" dirty="0" smtClean="0"/>
+              <a:t>Se positionner sur le master du dépôt page-web-participative-</a:t>
+            </a:r>
+            <a:r>
+              <a:rPr lang="fr-CH" dirty="0" err="1" smtClean="0"/>
+              <a:t>rebase</a:t>
+            </a:r>
+            <a:endParaRPr lang="fr-CH" dirty="0" smtClean="0"/>
+          </a:p>
+          <a:p>
+            <a:r>
+              <a:rPr lang="fr-CH" dirty="0" smtClean="0"/>
+              <a:t>Faire une branche </a:t>
+            </a:r>
+            <a:r>
+              <a:rPr lang="fr-CH" dirty="0" err="1" smtClean="0"/>
+              <a:t>feature-awesome_new_button</a:t>
+            </a:r>
+            <a:r>
+              <a:rPr lang="fr-CH" dirty="0" smtClean="0"/>
+              <a:t> en partant de la branche </a:t>
+            </a:r>
+            <a:r>
+              <a:rPr lang="fr-CH" dirty="0" err="1" smtClean="0"/>
+              <a:t>feature-new_button</a:t>
+            </a:r>
+            <a:endParaRPr lang="fr-CH" dirty="0" smtClean="0"/>
+          </a:p>
+          <a:p>
+            <a:r>
+              <a:rPr lang="fr-CH" dirty="0" smtClean="0"/>
+              <a:t>Faire quelques </a:t>
+            </a:r>
+            <a:r>
+              <a:rPr lang="fr-CH" dirty="0" err="1" smtClean="0"/>
+              <a:t>commits</a:t>
+            </a:r>
+            <a:r>
               <a:rPr lang="fr-CH" dirty="0"/>
-              <a:t>Pour faire une </a:t>
-            </a:r>
-            <a:r>
-              <a:rPr lang="fr-CH" dirty="0" smtClean="0"/>
-              <a:t>dichotomie </a:t>
+              <a:t> et </a:t>
+            </a:r>
+            <a:r>
+              <a:rPr lang="fr-CH" dirty="0" smtClean="0"/>
+              <a:t>observer </a:t>
             </a:r>
             <a:r>
               <a:rPr lang="fr-CH" dirty="0"/>
-              <a:t>sur vos commit afin de trouver le commit qui a introduit </a:t>
-            </a:r>
-            <a:r>
-              <a:rPr lang="fr-CH" dirty="0" smtClean="0"/>
-              <a:t>une régression</a:t>
-            </a:r>
-          </a:p>
-          <a:p>
-            <a:pPr lvl="1"/>
-            <a:r>
-              <a:rPr lang="fr-CH" dirty="0" smtClean="0"/>
-              <a:t>Manuel : git </a:t>
+              <a:t>le log et son graphe</a:t>
+            </a:r>
+            <a:endParaRPr lang="fr-CH" dirty="0" smtClean="0"/>
+          </a:p>
+          <a:p>
+            <a:r>
+              <a:rPr lang="fr-CH" dirty="0" smtClean="0"/>
+              <a:t>Faire en sorte que la branche </a:t>
             </a:r>
             <a:r>
               <a:rPr lang="fr-CH" dirty="0" err="1" smtClean="0"/>
-              <a:t>bisect</a:t>
-            </a:r>
-            <a:r>
-              <a:rPr lang="fr-CH" dirty="0" smtClean="0"/>
+              <a:t>feature-awesome_new_button</a:t>
+            </a:r>
+            <a:r>
+              <a:rPr lang="fr-CH" dirty="0" smtClean="0"/>
+              <a:t> démarre en fait de master</a:t>
+            </a:r>
+          </a:p>
+          <a:p>
+            <a:r>
+              <a:rPr lang="fr-CH" dirty="0"/>
+              <a:t>Observer le log et son </a:t>
+            </a:r>
+            <a:r>
+              <a:rPr lang="fr-CH" dirty="0" smtClean="0"/>
+              <a:t>graphe et constater l’impact du git </a:t>
+            </a:r>
+            <a:r>
+              <a:rPr lang="fr-CH" dirty="0" err="1" smtClean="0"/>
+              <a:t>rebase</a:t>
+            </a:r>
+            <a:r>
+              <a:rPr lang="fr-CH" dirty="0"/>
               <a:t> </a:t>
             </a:r>
             <a:r>
-              <a:rPr lang="fr-CH" dirty="0" err="1" smtClean="0"/>
-              <a:t>start</a:t>
-            </a:r>
-            <a:endParaRPr lang="fr-CH" dirty="0" smtClean="0"/>
-          </a:p>
-          <a:p>
-            <a:pPr lvl="1"/>
-            <a:r>
-              <a:rPr lang="fr-CH" dirty="0" smtClean="0"/>
-              <a:t>Automatique : git </a:t>
-            </a:r>
-            <a:r>
-              <a:rPr lang="fr-CH" dirty="0" err="1" smtClean="0"/>
-              <a:t>bisect</a:t>
-            </a:r>
-            <a:r>
-              <a:rPr lang="fr-CH" dirty="0" smtClean="0"/>
-              <a:t> </a:t>
-            </a:r>
-            <a:r>
-              <a:rPr lang="fr-CH" dirty="0" err="1" smtClean="0"/>
-              <a:t>run</a:t>
-            </a:r>
-            <a:r>
-              <a:rPr lang="fr-CH" dirty="0" smtClean="0"/>
-              <a:t> </a:t>
-            </a:r>
-            <a:r>
-              <a:rPr lang="fr-CH" dirty="0" err="1" smtClean="0"/>
-              <a:t>my_script</a:t>
-            </a:r>
-            <a:r>
-              <a:rPr lang="fr-CH" dirty="0" smtClean="0"/>
-              <a:t> arguments</a:t>
-            </a:r>
-            <a:endParaRPr lang="fr-CH" dirty="0"/>
+              <a:rPr lang="fr-CH" dirty="0" smtClean="0"/>
+              <a:t>--onto</a:t>
+            </a:r>
           </a:p>
         </p:txBody>
       </p:sp>
     </p:spTree>
     <p:extLst>
       <p:ext uri="{BB962C8B-B14F-4D97-AF65-F5344CB8AC3E}">
-        <p14:creationId xmlns:p14="http://schemas.microsoft.com/office/powerpoint/2010/main" val="735586294"/>
+        <p14:creationId xmlns:p14="http://schemas.microsoft.com/office/powerpoint/2010/main" val="1393638253"/>
       </p:ext>
     </p:extLst>
   </p:cSld>
@@ -16385,6 +16372,149 @@
           <a:lstStyle/>
           <a:p>
             <a:r>
+              <a:rPr lang="fr-CH" dirty="0"/>
+              <a:t>Pour faire une </a:t>
+            </a:r>
+            <a:r>
+              <a:rPr lang="fr-CH" dirty="0" smtClean="0"/>
+              <a:t>dichotomie </a:t>
+            </a:r>
+            <a:r>
+              <a:rPr lang="fr-CH" dirty="0"/>
+              <a:t>sur vos commit afin de trouver le commit qui a introduit </a:t>
+            </a:r>
+            <a:r>
+              <a:rPr lang="fr-CH" dirty="0" smtClean="0"/>
+              <a:t>une régression</a:t>
+            </a:r>
+          </a:p>
+          <a:p>
+            <a:pPr lvl="1"/>
+            <a:r>
+              <a:rPr lang="fr-CH" dirty="0" smtClean="0"/>
+              <a:t>Manuel : git </a:t>
+            </a:r>
+            <a:r>
+              <a:rPr lang="fr-CH" dirty="0" err="1" smtClean="0"/>
+              <a:t>bisect</a:t>
+            </a:r>
+            <a:r>
+              <a:rPr lang="fr-CH" dirty="0" smtClean="0"/>
+              <a:t> </a:t>
+            </a:r>
+            <a:r>
+              <a:rPr lang="fr-CH" dirty="0" err="1" smtClean="0"/>
+              <a:t>start</a:t>
+            </a:r>
+            <a:endParaRPr lang="fr-CH" dirty="0" smtClean="0"/>
+          </a:p>
+          <a:p>
+            <a:pPr lvl="1"/>
+            <a:r>
+              <a:rPr lang="fr-CH" dirty="0" smtClean="0"/>
+              <a:t>Automatique : git </a:t>
+            </a:r>
+            <a:r>
+              <a:rPr lang="fr-CH" dirty="0" err="1" smtClean="0"/>
+              <a:t>bisect</a:t>
+            </a:r>
+            <a:r>
+              <a:rPr lang="fr-CH" dirty="0" smtClean="0"/>
+              <a:t> </a:t>
+            </a:r>
+            <a:r>
+              <a:rPr lang="fr-CH" dirty="0" err="1" smtClean="0"/>
+              <a:t>run</a:t>
+            </a:r>
+            <a:r>
+              <a:rPr lang="fr-CH" dirty="0" smtClean="0"/>
+              <a:t> </a:t>
+            </a:r>
+            <a:r>
+              <a:rPr lang="fr-CH" dirty="0" err="1" smtClean="0"/>
+              <a:t>my_script</a:t>
+            </a:r>
+            <a:r>
+              <a:rPr lang="fr-CH" dirty="0" smtClean="0"/>
+              <a:t> arguments</a:t>
+            </a:r>
+            <a:endParaRPr lang="fr-CH" dirty="0"/>
+          </a:p>
+        </p:txBody>
+      </p:sp>
+    </p:spTree>
+    <p:extLst>
+      <p:ext uri="{BB962C8B-B14F-4D97-AF65-F5344CB8AC3E}">
+        <p14:creationId xmlns:p14="http://schemas.microsoft.com/office/powerpoint/2010/main" val="735586294"/>
+      </p:ext>
+    </p:extLst>
+  </p:cSld>
+  <p:clrMapOvr>
+    <a:masterClrMapping/>
+  </p:clrMapOvr>
+</p:sld>
+</file>
+
+<file path=ppt/slides/slide25.xml><?xml version="1.0" encoding="utf-8"?>
+<p:sld xmlns:a="http://schemas.openxmlformats.org/drawingml/2006/main" xmlns:r="http://schemas.openxmlformats.org/officeDocument/2006/relationships" xmlns:p="http://schemas.openxmlformats.org/presentationml/2006/main">
+  <p:cSld>
+    <p:spTree>
+      <p:nvGrpSpPr>
+        <p:cNvPr id="1" name=""/>
+        <p:cNvGrpSpPr/>
+        <p:nvPr/>
+      </p:nvGrpSpPr>
+      <p:grpSpPr>
+        <a:xfrm>
+          <a:off x="0" y="0"/>
+          <a:ext cx="0" cy="0"/>
+          <a:chOff x="0" y="0"/>
+          <a:chExt cx="0" cy="0"/>
+        </a:xfrm>
+      </p:grpSpPr>
+      <p:sp>
+        <p:nvSpPr>
+          <p:cNvPr id="2" name="Titre 1"/>
+          <p:cNvSpPr>
+            <a:spLocks noGrp="1"/>
+          </p:cNvSpPr>
+          <p:nvPr>
+            <p:ph type="title"/>
+          </p:nvPr>
+        </p:nvSpPr>
+        <p:spPr/>
+        <p:txBody>
+          <a:bodyPr/>
+          <a:lstStyle/>
+          <a:p>
+            <a:r>
+              <a:rPr lang="fr-CH" dirty="0" smtClean="0"/>
+              <a:t>git </a:t>
+            </a:r>
+            <a:r>
+              <a:rPr lang="fr-CH" dirty="0" err="1" smtClean="0"/>
+              <a:t>bisect</a:t>
+            </a:r>
+            <a:endParaRPr lang="fr-CH" dirty="0"/>
+          </a:p>
+        </p:txBody>
+      </p:sp>
+      <p:sp>
+        <p:nvSpPr>
+          <p:cNvPr id="3" name="Espace réservé du contenu 2"/>
+          <p:cNvSpPr>
+            <a:spLocks noGrp="1"/>
+          </p:cNvSpPr>
+          <p:nvPr>
+            <p:ph idx="1"/>
+          </p:nvPr>
+        </p:nvSpPr>
+        <p:spPr/>
+        <p:txBody>
+          <a:bodyPr/>
+          <a:lstStyle/>
+          <a:p>
+            <a:r>
               <a:rPr lang="fr-CH" dirty="0" smtClean="0"/>
               <a:t>Récupérer la branche master du projet </a:t>
             </a:r>
@@ -16450,7 +16580,7 @@
 </p:sld>
 </file>
 
-<file path=ppt/slides/slide25.xml><?xml version="1.0" encoding="utf-8"?>
+<file path=ppt/slides/slide26.xml><?xml version="1.0" encoding="utf-8"?>
 <p:sld xmlns:a="http://schemas.openxmlformats.org/drawingml/2006/main" xmlns:r="http://schemas.openxmlformats.org/officeDocument/2006/relationships" xmlns:p="http://schemas.openxmlformats.org/presentationml/2006/main">
   <p:cSld>
     <p:spTree>
@@ -16555,194 +16685,6 @@
 </p:sld>
 </file>
 
-<file path=ppt/slides/slide26.xml><?xml version="1.0" encoding="utf-8"?>
-<p:sld xmlns:a="http://schemas.openxmlformats.org/drawingml/2006/main" xmlns:r="http://schemas.openxmlformats.org/officeDocument/2006/relationships" xmlns:p="http://schemas.openxmlformats.org/presentationml/2006/main">
-  <p:cSld>
-    <p:spTree>
-      <p:nvGrpSpPr>
-        <p:cNvPr id="1" name=""/>
-        <p:cNvGrpSpPr/>
-        <p:nvPr/>
-      </p:nvGrpSpPr>
-      <p:grpSpPr>
-        <a:xfrm>
-          <a:off x="0" y="0"/>
-          <a:ext cx="0" cy="0"/>
-          <a:chOff x="0" y="0"/>
-          <a:chExt cx="0" cy="0"/>
-        </a:xfrm>
-      </p:grpSpPr>
-      <p:sp>
-        <p:nvSpPr>
-          <p:cNvPr id="2" name="Titre 1"/>
-          <p:cNvSpPr>
-            <a:spLocks noGrp="1"/>
-          </p:cNvSpPr>
-          <p:nvPr>
-            <p:ph type="title"/>
-          </p:nvPr>
-        </p:nvSpPr>
-        <p:spPr/>
-        <p:txBody>
-          <a:bodyPr/>
-          <a:lstStyle/>
-          <a:p>
-            <a:r>
-              <a:rPr lang="fr-CH" dirty="0" smtClean="0"/>
-              <a:t>git </a:t>
-            </a:r>
-            <a:r>
-              <a:rPr lang="fr-CH" dirty="0" err="1" smtClean="0"/>
-              <a:t>checkout</a:t>
-            </a:r>
-            <a:endParaRPr lang="fr-CH" dirty="0"/>
-          </a:p>
-        </p:txBody>
-      </p:sp>
-      <p:sp>
-        <p:nvSpPr>
-          <p:cNvPr id="3" name="Espace réservé du contenu 2"/>
-          <p:cNvSpPr>
-            <a:spLocks noGrp="1"/>
-          </p:cNvSpPr>
-          <p:nvPr>
-            <p:ph idx="1"/>
-          </p:nvPr>
-        </p:nvSpPr>
-        <p:spPr>
-          <a:xfrm>
-            <a:off x="950384" y="1951038"/>
-            <a:ext cx="10281992" cy="3543600"/>
-          </a:xfrm>
-        </p:spPr>
-        <p:txBody>
-          <a:bodyPr/>
-          <a:lstStyle/>
-          <a:p>
-            <a:r>
-              <a:rPr lang="fr-CH" dirty="0"/>
-              <a:t>Amener votre environnement sur une version connue</a:t>
-            </a:r>
-          </a:p>
-          <a:p>
-            <a:pPr lvl="1"/>
-            <a:r>
-              <a:rPr lang="fr-CH" dirty="0" smtClean="0"/>
-              <a:t>git </a:t>
-            </a:r>
-            <a:r>
-              <a:rPr lang="fr-CH" dirty="0" err="1"/>
-              <a:t>checkout</a:t>
-            </a:r>
-            <a:r>
-              <a:rPr lang="fr-CH" dirty="0"/>
-              <a:t> {</a:t>
-            </a:r>
-            <a:r>
-              <a:rPr lang="fr-CH" dirty="0" err="1"/>
-              <a:t>shorthash</a:t>
-            </a:r>
-            <a:r>
-              <a:rPr lang="fr-CH" dirty="0" smtClean="0"/>
-              <a:t>}</a:t>
-            </a:r>
-          </a:p>
-          <a:p>
-            <a:r>
-              <a:rPr lang="fr-CH" dirty="0"/>
-              <a:t>Lorsque vous revenez à un commit antérieur, votre environnement de travail est placé sur </a:t>
-            </a:r>
-            <a:r>
-              <a:rPr lang="fr-CH" dirty="0" smtClean="0"/>
-              <a:t>un “DETACHED </a:t>
-            </a:r>
-            <a:r>
-              <a:rPr lang="fr-CH" dirty="0"/>
-              <a:t>HEAD”. Si vous </a:t>
-            </a:r>
-            <a:r>
-              <a:rPr lang="fr-CH" dirty="0" err="1"/>
-              <a:t>commitez</a:t>
-            </a:r>
-            <a:r>
-              <a:rPr lang="fr-CH" dirty="0"/>
-              <a:t> du contenu à partir de là, il créera une branche </a:t>
-            </a:r>
-            <a:r>
-              <a:rPr lang="fr-CH" dirty="0" smtClean="0"/>
-              <a:t>virtuelle référencée </a:t>
-            </a:r>
-            <a:r>
-              <a:rPr lang="fr-CH" dirty="0"/>
-              <a:t>nulle part.</a:t>
-            </a:r>
-          </a:p>
-          <a:p>
-            <a:pPr lvl="1"/>
-            <a:r>
-              <a:rPr lang="fr-CH" dirty="0"/>
-              <a:t>Ne </a:t>
-            </a:r>
-            <a:r>
-              <a:rPr lang="fr-CH" dirty="0" err="1"/>
-              <a:t>commitez</a:t>
-            </a:r>
-            <a:r>
-              <a:rPr lang="fr-CH" dirty="0"/>
-              <a:t> pas de contenu après un </a:t>
-            </a:r>
-            <a:r>
-              <a:rPr lang="fr-CH" dirty="0" err="1"/>
-              <a:t>checkout</a:t>
-            </a:r>
-            <a:r>
-              <a:rPr lang="fr-CH" dirty="0"/>
-              <a:t> sur un commit </a:t>
-            </a:r>
-            <a:r>
-              <a:rPr lang="fr-CH" dirty="0" smtClean="0"/>
-              <a:t>spécifique</a:t>
-            </a:r>
-            <a:r>
-              <a:rPr lang="fr-CH" dirty="0"/>
-              <a:t> </a:t>
-            </a:r>
-            <a:r>
-              <a:rPr lang="fr-CH" dirty="0" smtClean="0"/>
-              <a:t>(</a:t>
-            </a:r>
-            <a:r>
-              <a:rPr lang="fr-CH" dirty="0" err="1" smtClean="0"/>
-              <a:t>garbage</a:t>
-            </a:r>
-            <a:r>
-              <a:rPr lang="fr-CH" dirty="0" smtClean="0"/>
-              <a:t> collector)</a:t>
-            </a:r>
-          </a:p>
-          <a:p>
-            <a:pPr lvl="1"/>
-            <a:r>
-              <a:rPr lang="fr-CH" dirty="0" smtClean="0"/>
-              <a:t>Sauf si… ?</a:t>
-            </a:r>
-            <a:endParaRPr lang="fr-CH" dirty="0"/>
-          </a:p>
-        </p:txBody>
-      </p:sp>
-    </p:spTree>
-    <p:extLst>
-      <p:ext uri="{BB962C8B-B14F-4D97-AF65-F5344CB8AC3E}">
-        <p14:creationId xmlns:p14="http://schemas.microsoft.com/office/powerpoint/2010/main" val="877634655"/>
-      </p:ext>
-    </p:extLst>
-  </p:cSld>
-  <p:clrMapOvr>
-    <a:masterClrMapping/>
-  </p:clrMapOvr>
-</p:sld>
-</file>
-
 <file path=ppt/slides/slide27.xml><?xml version="1.0" encoding="utf-8"?>
 <p:sld xmlns:a="http://schemas.openxmlformats.org/drawingml/2006/main" xmlns:r="http://schemas.openxmlformats.org/officeDocument/2006/relationships" xmlns:p="http://schemas.openxmlformats.org/presentationml/2006/main">
   <p:cSld>
@@ -16808,8 +16750,111 @@
           <a:lstStyle/>
           <a:p>
             <a:r>
-              <a:rPr lang="fr-CH" dirty="0" smtClean="0"/>
-              <a:t>Créez une nouvelle branche à partir du commit «Simplification du test»</a:t>
+              <a:rPr lang="fr-CH" dirty="0"/>
+              <a:t>Amener votre environnement sur une version connue</a:t>
+            </a:r>
+          </a:p>
+          <a:p>
+            <a:pPr lvl="1"/>
+            <a:r>
+              <a:rPr lang="fr-CH" dirty="0" smtClean="0"/>
+              <a:t>git </a:t>
+            </a:r>
+            <a:r>
+              <a:rPr lang="fr-CH" dirty="0" err="1"/>
+              <a:t>checkout</a:t>
+            </a:r>
+            <a:r>
+              <a:rPr lang="fr-CH" dirty="0"/>
+              <a:t> {</a:t>
+            </a:r>
+            <a:r>
+              <a:rPr lang="fr-CH" dirty="0" err="1"/>
+              <a:t>shorthash</a:t>
+            </a:r>
+            <a:r>
+              <a:rPr lang="fr-CH" dirty="0" smtClean="0"/>
+              <a:t>}</a:t>
+            </a:r>
+          </a:p>
+          <a:p>
+            <a:r>
+              <a:rPr lang="fr-CH" dirty="0"/>
+              <a:t>Lorsque vous revenez à un commit antérieur, votre environnement de travail est placé sur </a:t>
+            </a:r>
+            <a:r>
+              <a:rPr lang="fr-CH" dirty="0" smtClean="0"/>
+              <a:t>un “DETACHED </a:t>
+            </a:r>
+            <a:r>
+              <a:rPr lang="fr-CH" dirty="0"/>
+              <a:t>HEAD”. Si vous </a:t>
+            </a:r>
+            <a:r>
+              <a:rPr lang="fr-CH" dirty="0" err="1"/>
+              <a:t>commitez</a:t>
+            </a:r>
+            <a:r>
+              <a:rPr lang="fr-CH" dirty="0"/>
+              <a:t> du contenu à partir de là, il créera une branche </a:t>
+            </a:r>
+            <a:r>
+              <a:rPr lang="fr-CH" dirty="0" smtClean="0"/>
+              <a:t>virtuelle référencée </a:t>
+            </a:r>
+            <a:r>
+              <a:rPr lang="fr-CH" dirty="0"/>
+              <a:t>nulle part.</a:t>
+            </a:r>
+          </a:p>
+          <a:p>
+            <a:pPr lvl="1"/>
+            <a:r>
+              <a:rPr lang="fr-CH" dirty="0"/>
+              <a:t>Ne </a:t>
+            </a:r>
+            <a:r>
+              <a:rPr lang="fr-CH" dirty="0" err="1"/>
+              <a:t>commitez</a:t>
+            </a:r>
+            <a:r>
+              <a:rPr lang="fr-CH" dirty="0"/>
+              <a:t> pas de contenu après un </a:t>
+            </a:r>
+            <a:r>
+              <a:rPr lang="fr-CH" dirty="0" err="1"/>
+              <a:t>checkout</a:t>
+            </a:r>
+            <a:r>
+              <a:rPr lang="fr-CH" dirty="0"/>
+              <a:t> sur un commit </a:t>
+            </a:r>
+            <a:r>
+              <a:rPr lang="fr-CH" dirty="0" smtClean="0"/>
+              <a:t>spécifique</a:t>
+            </a:r>
+            <a:r>
+              <a:rPr lang="fr-CH" dirty="0"/>
+              <a:t> </a:t>
+            </a:r>
+            <a:r>
+              <a:rPr lang="fr-CH" dirty="0" smtClean="0"/>
+              <a:t>(</a:t>
+            </a:r>
+            <a:r>
+              <a:rPr lang="fr-CH" dirty="0" err="1" smtClean="0"/>
+              <a:t>garbage</a:t>
+            </a:r>
+            <a:r>
+              <a:rPr lang="fr-CH" dirty="0" smtClean="0"/>
+              <a:t> collector)</a:t>
+            </a:r>
+          </a:p>
+          <a:p>
+            <a:pPr lvl="1"/>
+            <a:r>
+              <a:rPr lang="fr-CH" dirty="0" smtClean="0"/>
+              <a:t>Sauf si… ?</a:t>
             </a:r>
             <a:endParaRPr lang="fr-CH" dirty="0"/>
           </a:p>
@@ -16818,7 +16863,7 @@
     </p:spTree>
     <p:extLst>
       <p:ext uri="{BB962C8B-B14F-4D97-AF65-F5344CB8AC3E}">
-        <p14:creationId xmlns:p14="http://schemas.microsoft.com/office/powerpoint/2010/main" val="3167818479"/>
+        <p14:creationId xmlns:p14="http://schemas.microsoft.com/office/powerpoint/2010/main" val="877634655"/>
       </p:ext>
     </p:extLst>
   </p:cSld>
@@ -16866,7 +16911,7 @@
             </a:r>
             <a:r>
               <a:rPr lang="fr-CH" dirty="0" err="1" smtClean="0"/>
-              <a:t>revert</a:t>
+              <a:t>checkout</a:t>
             </a:r>
             <a:endParaRPr lang="fr-CH" dirty="0"/>
           </a:p>
@@ -16882,111 +16927,19 @@
             <p:ph idx="1"/>
           </p:nvPr>
         </p:nvSpPr>
-        <p:spPr/>
+        <p:spPr>
+          <a:xfrm>
+            <a:off x="950384" y="1951038"/>
+            <a:ext cx="10281992" cy="3543600"/>
+          </a:xfrm>
+        </p:spPr>
         <p:txBody>
           <a:bodyPr/>
           <a:lstStyle/>
           <a:p>
             <a:r>
-              <a:rPr lang="fr-CH" dirty="0">
-                <a:solidFill>
-                  <a:srgbClr val="FF0000"/>
-                </a:solidFill>
-              </a:rPr>
-              <a:t>Construit un nouveau commit </a:t>
-            </a:r>
-            <a:r>
-              <a:rPr lang="fr-CH" dirty="0"/>
-              <a:t>qui annule un commit antérieur. C’est l’opération </a:t>
-            </a:r>
-            <a:r>
-              <a:rPr lang="fr-CH" dirty="0" smtClean="0"/>
-              <a:t>à utiliser </a:t>
-            </a:r>
-            <a:r>
-              <a:rPr lang="fr-CH" dirty="0"/>
-              <a:t>pour faire disparaître explicitement un </a:t>
-            </a:r>
-            <a:r>
-              <a:rPr lang="fr-CH" dirty="0" smtClean="0"/>
-              <a:t>commit</a:t>
-            </a:r>
-          </a:p>
-          <a:p>
-            <a:pPr lvl="1"/>
-            <a:r>
-              <a:rPr lang="fr-CH" dirty="0"/>
-              <a:t>git </a:t>
-            </a:r>
-            <a:r>
-              <a:rPr lang="fr-CH" dirty="0" err="1"/>
-              <a:t>revert</a:t>
-            </a:r>
-            <a:r>
-              <a:rPr lang="fr-CH" dirty="0"/>
-              <a:t> {</a:t>
-            </a:r>
-            <a:r>
-              <a:rPr lang="fr-CH" dirty="0" err="1"/>
-              <a:t>shorthash</a:t>
-            </a:r>
-            <a:r>
-              <a:rPr lang="fr-CH" dirty="0" smtClean="0"/>
-              <a:t>}</a:t>
-            </a:r>
-          </a:p>
-          <a:p>
-            <a:r>
-              <a:rPr lang="fr-CH" dirty="0"/>
-              <a:t>Pour que la commande fonctionne, votre </a:t>
-            </a:r>
-            <a:r>
-              <a:rPr lang="fr-CH" dirty="0" err="1"/>
-              <a:t>staging</a:t>
-            </a:r>
-            <a:r>
-              <a:rPr lang="fr-CH" dirty="0"/>
-              <a:t> et votre environnement de </a:t>
-            </a:r>
-            <a:r>
-              <a:rPr lang="fr-CH" dirty="0" smtClean="0"/>
-              <a:t>travail ne </a:t>
-            </a:r>
-            <a:r>
-              <a:rPr lang="fr-CH" dirty="0"/>
-              <a:t>doivent pas contenir de modifications en </a:t>
-            </a:r>
-            <a:r>
-              <a:rPr lang="fr-CH" dirty="0" smtClean="0"/>
-              <a:t>cours</a:t>
-            </a:r>
-          </a:p>
-          <a:p>
-            <a:endParaRPr lang="fr-CH" dirty="0"/>
-          </a:p>
-          <a:p>
-            <a:endParaRPr lang="fr-CH" dirty="0" smtClean="0"/>
-          </a:p>
-          <a:p>
-            <a:r>
-              <a:rPr lang="fr-CH" dirty="0" smtClean="0"/>
-              <a:t>Faites un </a:t>
-            </a:r>
-            <a:r>
-              <a:rPr lang="fr-CH" dirty="0" err="1" smtClean="0"/>
-              <a:t>revert</a:t>
-            </a:r>
-            <a:r>
-              <a:rPr lang="fr-CH" dirty="0" smtClean="0"/>
-              <a:t> du commit «</a:t>
-            </a:r>
-            <a:r>
-              <a:rPr lang="fr-CH" dirty="0"/>
-              <a:t>Bilingue et adaptation du </a:t>
-            </a:r>
-            <a:r>
-              <a:rPr lang="fr-CH" dirty="0" smtClean="0"/>
-              <a:t>test»</a:t>
+              <a:rPr lang="fr-CH" dirty="0" smtClean="0"/>
+              <a:t>Créez une nouvelle branche à partir du commit «Simplification du test»</a:t>
             </a:r>
             <a:endParaRPr lang="fr-CH" dirty="0"/>
           </a:p>
@@ -16995,7 +16948,7 @@
     </p:spTree>
     <p:extLst>
       <p:ext uri="{BB962C8B-B14F-4D97-AF65-F5344CB8AC3E}">
-        <p14:creationId xmlns:p14="http://schemas.microsoft.com/office/powerpoint/2010/main" val="3538104851"/>
+        <p14:creationId xmlns:p14="http://schemas.microsoft.com/office/powerpoint/2010/main" val="3167818479"/>
       </p:ext>
     </p:extLst>
   </p:cSld>
@@ -17039,7 +16992,11 @@
           <a:p>
             <a:r>
               <a:rPr lang="fr-CH" dirty="0" smtClean="0"/>
-              <a:t>git reset</a:t>
+              <a:t>git </a:t>
+            </a:r>
+            <a:r>
+              <a:rPr lang="fr-CH" dirty="0" err="1" smtClean="0"/>
+              <a:t>revert</a:t>
             </a:r>
             <a:endParaRPr lang="fr-CH" dirty="0"/>
           </a:p>
@@ -17066,30 +17023,38 @@
                   <a:srgbClr val="FF0000"/>
                 </a:solidFill>
               </a:rPr>
-              <a:t>Reset permet de jouer sur l’historique</a:t>
+              <a:t>Construit un nouveau commit </a:t>
             </a:r>
             <a:r>
               <a:rPr lang="fr-CH" dirty="0"/>
-              <a:t>. Vous pouvez déplacer le HEAD de </a:t>
-            </a:r>
-            <a:r>
-              <a:rPr lang="fr-CH" dirty="0" smtClean="0"/>
-              <a:t>votre branche </a:t>
+              <a:t>qui annule un commit antérieur. C’est l’opération </a:t>
+            </a:r>
+            <a:r>
+              <a:rPr lang="fr-CH" dirty="0" smtClean="0"/>
+              <a:t>à utiliser </a:t>
             </a:r>
             <a:r>
               <a:rPr lang="fr-CH" dirty="0"/>
-              <a:t>active sur un commit antérieur.</a:t>
+              <a:t>pour faire disparaître explicitement un </a:t>
+            </a:r>
+            <a:r>
+              <a:rPr lang="fr-CH" dirty="0" smtClean="0"/>
+              <a:t>commit</a:t>
             </a:r>
           </a:p>
           <a:p>
             <a:pPr lvl="1"/>
             <a:r>
-              <a:rPr lang="fr-CH" dirty="0" smtClean="0"/>
+              <a:rPr lang="fr-CH" dirty="0"/>
               <a:t>git </a:t>
             </a:r>
             <a:r>
+              <a:rPr lang="fr-CH" dirty="0" err="1"/>
+              <a:t>revert</a:t>
+            </a:r>
+            <a:r>
               <a:rPr lang="fr-CH" dirty="0"/>
-              <a:t>reset {</a:t>
+              <a:t> {</a:t>
             </a:r>
             <a:r>
               <a:rPr lang="fr-CH" dirty="0" err="1"/>
@@ -17103,7 +17068,7 @@
           <a:p>
             <a:r>
               <a:rPr lang="fr-CH" dirty="0"/>
-              <a:t>Les changements sont remis en zone de </a:t>
+              <a:t>Pour que la commande fonctionne, votre </a:t>
             </a:r>
             <a:r>
               <a:rPr lang="fr-CH" dirty="0" err="1"/>
@@ -17111,15 +17076,47 @@
             </a:r>
             <a:r>
               <a:rPr lang="fr-CH" dirty="0"/>
-              <a:t>. Vous pouvez reconstruire pas à pas vos </a:t>
+              <a:t> et votre environnement de </a:t>
+            </a:r>
+            <a:r>
+              <a:rPr lang="fr-CH" dirty="0" smtClean="0"/>
+              <a:t>travail ne </a:t>
+            </a:r>
+            <a:r>
+              <a:rPr lang="fr-CH" dirty="0"/>
+              <a:t>doivent pas contenir de modifications en </a:t>
+            </a:r>
+            <a:r>
+              <a:rPr lang="fr-CH" dirty="0" smtClean="0"/>
+              <a:t>cours</a:t>
+            </a:r>
+          </a:p>
+          <a:p>
+            <a:endParaRPr lang="fr-CH" dirty="0"/>
+          </a:p>
+          <a:p>
+            <a:endParaRPr lang="fr-CH" dirty="0" smtClean="0"/>
+          </a:p>
+          <a:p>
+            <a:r>
+              <a:rPr lang="fr-CH" dirty="0" smtClean="0"/>
+              <a:t>Faites un </a:t>
             </a:r>
             <a:r>
               <a:rPr lang="fr-CH" dirty="0" err="1" smtClean="0"/>
-              <a:t>commits</a:t>
-            </a:r>
-            <a:r>
-              <a:rPr lang="fr-CH" dirty="0" smtClean="0"/>
-              <a:t>.</a:t>
+              <a:t>revert</a:t>
+            </a:r>
+            <a:r>
+              <a:rPr lang="fr-CH" dirty="0" smtClean="0"/>
+              <a:t> du commit «</a:t>
+            </a:r>
+            <a:r>
+              <a:rPr lang="fr-CH" dirty="0"/>
+              <a:t>Bilingue et adaptation du </a:t>
+            </a:r>
+            <a:r>
+              <a:rPr lang="fr-CH" dirty="0" smtClean="0"/>
+              <a:t>test»</a:t>
             </a:r>
             <a:endParaRPr lang="fr-CH" dirty="0"/>
           </a:p>
@@ -17128,7 +17125,7 @@
     </p:spTree>
     <p:extLst>
       <p:ext uri="{BB962C8B-B14F-4D97-AF65-F5344CB8AC3E}">
-        <p14:creationId xmlns:p14="http://schemas.microsoft.com/office/powerpoint/2010/main" val="3254708671"/>
+        <p14:creationId xmlns:p14="http://schemas.microsoft.com/office/powerpoint/2010/main" val="3538104851"/>
       </p:ext>
     </p:extLst>
   </p:cSld>
@@ -17282,7 +17279,7 @@
     </p:spTree>
     <p:extLst>
       <p:ext uri="{BB962C8B-B14F-4D97-AF65-F5344CB8AC3E}">
-        <p14:creationId xmlns:p14="http://schemas.microsoft.com/office/powerpoint/2010/main" val="1697854684"/>
+        <p14:creationId xmlns:p14="http://schemas.microsoft.com/office/powerpoint/2010/main" val="3934817676"/>
       </p:ext>
     </p:extLst>
   </p:cSld>
@@ -17348,6 +17345,139 @@
           <a:lstStyle/>
           <a:p>
             <a:r>
+              <a:rPr lang="fr-CH" dirty="0">
+                <a:solidFill>
+                  <a:srgbClr val="FF0000"/>
+                </a:solidFill>
+              </a:rPr>
+              <a:t>Reset permet de jouer sur l’historique</a:t>
+            </a:r>
+            <a:r>
+              <a:rPr lang="fr-CH" dirty="0"/>
+              <a:t>. Vous pouvez déplacer le HEAD de </a:t>
+            </a:r>
+            <a:r>
+              <a:rPr lang="fr-CH" dirty="0" smtClean="0"/>
+              <a:t>votre branche </a:t>
+            </a:r>
+            <a:r>
+              <a:rPr lang="fr-CH" dirty="0"/>
+              <a:t>active sur un commit antérieur.</a:t>
+            </a:r>
+          </a:p>
+          <a:p>
+            <a:pPr lvl="1"/>
+            <a:r>
+              <a:rPr lang="fr-CH" dirty="0" smtClean="0"/>
+              <a:t>git </a:t>
+            </a:r>
+            <a:r>
+              <a:rPr lang="fr-CH" dirty="0"/>
+              <a:t>reset {</a:t>
+            </a:r>
+            <a:r>
+              <a:rPr lang="fr-CH" dirty="0" err="1"/>
+              <a:t>shorthash</a:t>
+            </a:r>
+            <a:r>
+              <a:rPr lang="fr-CH" dirty="0" smtClean="0"/>
+              <a:t>}</a:t>
+            </a:r>
+          </a:p>
+          <a:p>
+            <a:r>
+              <a:rPr lang="fr-CH" dirty="0"/>
+              <a:t>Les changements sont remis en zone de </a:t>
+            </a:r>
+            <a:r>
+              <a:rPr lang="fr-CH" dirty="0" err="1"/>
+              <a:t>staging</a:t>
+            </a:r>
+            <a:r>
+              <a:rPr lang="fr-CH" dirty="0"/>
+              <a:t>. Vous pouvez reconstruire pas à pas vos </a:t>
+            </a:r>
+            <a:r>
+              <a:rPr lang="fr-CH" dirty="0" err="1" smtClean="0"/>
+              <a:t>commits</a:t>
+            </a:r>
+            <a:r>
+              <a:rPr lang="fr-CH" dirty="0" smtClean="0"/>
+              <a:t>.</a:t>
+            </a:r>
+            <a:endParaRPr lang="fr-CH" dirty="0"/>
+          </a:p>
+        </p:txBody>
+      </p:sp>
+    </p:spTree>
+    <p:extLst>
+      <p:ext uri="{BB962C8B-B14F-4D97-AF65-F5344CB8AC3E}">
+        <p14:creationId xmlns:p14="http://schemas.microsoft.com/office/powerpoint/2010/main" val="3254708671"/>
+      </p:ext>
+    </p:extLst>
+  </p:cSld>
+  <p:clrMapOvr>
+    <a:masterClrMapping/>
+  </p:clrMapOvr>
+</p:sld>
+</file>
+
+<file path=ppt/slides/slide31.xml><?xml version="1.0" encoding="utf-8"?>
+<p:sld xmlns:a="http://schemas.openxmlformats.org/drawingml/2006/main" xmlns:r="http://schemas.openxmlformats.org/officeDocument/2006/relationships" xmlns:p="http://schemas.openxmlformats.org/presentationml/2006/main">
+  <p:cSld>
+    <p:spTree>
+      <p:nvGrpSpPr>
+        <p:cNvPr id="1" name=""/>
+        <p:cNvGrpSpPr/>
+        <p:nvPr/>
+      </p:nvGrpSpPr>
+      <p:grpSpPr>
+        <a:xfrm>
+          <a:off x="0" y="0"/>
+          <a:ext cx="0" cy="0"/>
+          <a:chOff x="0" y="0"/>
+          <a:chExt cx="0" cy="0"/>
+        </a:xfrm>
+      </p:grpSpPr>
+      <p:sp>
+        <p:nvSpPr>
+          <p:cNvPr id="2" name="Titre 1"/>
+          <p:cNvSpPr>
+            <a:spLocks noGrp="1"/>
+          </p:cNvSpPr>
+          <p:nvPr>
+            <p:ph type="title"/>
+          </p:nvPr>
+        </p:nvSpPr>
+        <p:spPr/>
+        <p:txBody>
+          <a:bodyPr/>
+          <a:lstStyle/>
+          <a:p>
+            <a:r>
+              <a:rPr lang="fr-CH" dirty="0" smtClean="0"/>
+              <a:t>git reset</a:t>
+            </a:r>
+            <a:endParaRPr lang="fr-CH" dirty="0"/>
+          </a:p>
+        </p:txBody>
+      </p:sp>
+      <p:sp>
+        <p:nvSpPr>
+          <p:cNvPr id="3" name="Espace réservé du contenu 2"/>
+          <p:cNvSpPr>
+            <a:spLocks noGrp="1"/>
+          </p:cNvSpPr>
+          <p:nvPr>
+            <p:ph idx="1"/>
+          </p:nvPr>
+        </p:nvSpPr>
+        <p:spPr/>
+        <p:txBody>
+          <a:bodyPr/>
+          <a:lstStyle/>
+          <a:p>
+            <a:r>
               <a:rPr lang="fr-CH" dirty="0" smtClean="0"/>
               <a:t>Modifiez un fichier et </a:t>
             </a:r>
@@ -17470,7 +17600,7 @@
 </p:sld>
 </file>
 
-<file path=ppt/slides/slide31.xml><?xml version="1.0" encoding="utf-8"?>
+<file path=ppt/slides/slide32.xml><?xml version="1.0" encoding="utf-8"?>
 <p:sld xmlns:a="http://schemas.openxmlformats.org/drawingml/2006/main" xmlns:r="http://schemas.openxmlformats.org/officeDocument/2006/relationships" xmlns:p="http://schemas.openxmlformats.org/presentationml/2006/main">
   <p:cSld>
     <p:spTree>
@@ -17579,7 +17709,7 @@
 </p:sld>
 </file>
 
-<file path=ppt/slides/slide32.xml><?xml version="1.0" encoding="utf-8"?>
+<file path=ppt/slides/slide33.xml><?xml version="1.0" encoding="utf-8"?>
 <p:sld xmlns:a="http://schemas.openxmlformats.org/drawingml/2006/main" xmlns:r="http://schemas.openxmlformats.org/officeDocument/2006/relationships" xmlns:p="http://schemas.openxmlformats.org/presentationml/2006/main">
   <p:cSld>
     <p:spTree>
@@ -17697,7 +17827,7 @@
 </p:sld>
 </file>
 
-<file path=ppt/slides/slide33.xml><?xml version="1.0" encoding="utf-8"?>
+<file path=ppt/slides/slide34.xml><?xml version="1.0" encoding="utf-8"?>
 <p:sld xmlns:a="http://schemas.openxmlformats.org/drawingml/2006/main" xmlns:r="http://schemas.openxmlformats.org/officeDocument/2006/relationships" xmlns:p="http://schemas.openxmlformats.org/presentationml/2006/main">
   <p:cSld>
     <p:spTree>
@@ -17852,137 +17982,6 @@
 </p:sld>
 </file>
 
-<file path=ppt/slides/slide34.xml><?xml version="1.0" encoding="utf-8"?>
-<p:sld xmlns:a="http://schemas.openxmlformats.org/drawingml/2006/main" xmlns:r="http://schemas.openxmlformats.org/officeDocument/2006/relationships" xmlns:p="http://schemas.openxmlformats.org/presentationml/2006/main">
-  <p:cSld>
-    <p:spTree>
-      <p:nvGrpSpPr>
-        <p:cNvPr id="1" name=""/>
-        <p:cNvGrpSpPr/>
-        <p:nvPr/>
-      </p:nvGrpSpPr>
-      <p:grpSpPr>
-        <a:xfrm>
-          <a:off x="0" y="0"/>
-          <a:ext cx="0" cy="0"/>
-          <a:chOff x="0" y="0"/>
-          <a:chExt cx="0" cy="0"/>
-        </a:xfrm>
-      </p:grpSpPr>
-      <p:sp>
-        <p:nvSpPr>
-          <p:cNvPr id="2" name="Titre 1"/>
-          <p:cNvSpPr>
-            <a:spLocks noGrp="1"/>
-          </p:cNvSpPr>
-          <p:nvPr>
-            <p:ph type="title"/>
-          </p:nvPr>
-        </p:nvSpPr>
-        <p:spPr/>
-        <p:txBody>
-          <a:bodyPr/>
-          <a:lstStyle/>
-          <a:p>
-            <a:r>
-              <a:rPr lang="fr-CH" dirty="0" smtClean="0"/>
-              <a:t>git </a:t>
-            </a:r>
-            <a:r>
-              <a:rPr lang="fr-CH" dirty="0" err="1" smtClean="0"/>
-              <a:t>rebase</a:t>
-            </a:r>
-            <a:r>
-              <a:rPr lang="fr-CH" dirty="0" smtClean="0"/>
-              <a:t> -i</a:t>
-            </a:r>
-            <a:endParaRPr lang="fr-CH" dirty="0"/>
-          </a:p>
-        </p:txBody>
-      </p:sp>
-      <p:sp>
-        <p:nvSpPr>
-          <p:cNvPr id="3" name="Espace réservé du contenu 2"/>
-          <p:cNvSpPr>
-            <a:spLocks noGrp="1"/>
-          </p:cNvSpPr>
-          <p:nvPr>
-            <p:ph idx="1"/>
-          </p:nvPr>
-        </p:nvSpPr>
-        <p:spPr>
-          <a:xfrm>
-            <a:off x="950384" y="1572097"/>
-            <a:ext cx="10281992" cy="4367384"/>
-          </a:xfrm>
-        </p:spPr>
-        <p:txBody>
-          <a:bodyPr>
-            <a:normAutofit/>
-          </a:bodyPr>
-          <a:lstStyle/>
-          <a:p>
-            <a:r>
-              <a:rPr lang="fr-CH" dirty="0" smtClean="0"/>
-              <a:t>Essayez de séparer un commit en plusieurs </a:t>
-            </a:r>
-            <a:r>
-              <a:rPr lang="fr-CH" dirty="0" err="1" smtClean="0"/>
-              <a:t>commits</a:t>
-            </a:r>
-            <a:r>
-              <a:rPr lang="fr-CH" dirty="0" smtClean="0"/>
-              <a:t> (cas d’un commit trop gros ou mélange de deux correctifs)</a:t>
-            </a:r>
-            <a:endParaRPr lang="fr-CH" dirty="0"/>
-          </a:p>
-          <a:p>
-            <a:pPr lvl="1"/>
-            <a:r>
-              <a:rPr lang="fr-CH" dirty="0" smtClean="0"/>
-              <a:t>git </a:t>
-            </a:r>
-            <a:r>
-              <a:rPr lang="fr-CH" dirty="0" err="1" smtClean="0"/>
-              <a:t>rebase</a:t>
-            </a:r>
-            <a:r>
-              <a:rPr lang="fr-CH" dirty="0" smtClean="0"/>
-              <a:t>, git reset, git </a:t>
-            </a:r>
-            <a:r>
-              <a:rPr lang="fr-CH" dirty="0" err="1" smtClean="0"/>
-              <a:t>add</a:t>
-            </a:r>
-            <a:r>
-              <a:rPr lang="fr-CH" dirty="0" smtClean="0"/>
-              <a:t>, git commit</a:t>
-            </a:r>
-          </a:p>
-          <a:p>
-            <a:endParaRPr lang="fr-CH" dirty="0"/>
-          </a:p>
-          <a:p>
-            <a:endParaRPr lang="fr-CH" dirty="0" smtClean="0"/>
-          </a:p>
-          <a:p>
-            <a:endParaRPr lang="fr-CH" dirty="0" smtClean="0"/>
-          </a:p>
-        </p:txBody>
-      </p:sp>
-    </p:spTree>
-    <p:extLst>
-      <p:ext uri="{BB962C8B-B14F-4D97-AF65-F5344CB8AC3E}">
-        <p14:creationId xmlns:p14="http://schemas.microsoft.com/office/powerpoint/2010/main" val="1475944714"/>
-      </p:ext>
-    </p:extLst>
-  </p:cSld>
-  <p:clrMapOvr>
-    <a:masterClrMapping/>
-  </p:clrMapOvr>
-</p:sld>
-</file>
-
 <file path=ppt/slides/slide35.xml><?xml version="1.0" encoding="utf-8"?>
 <p:sld xmlns:a="http://schemas.openxmlformats.org/drawingml/2006/main" xmlns:r="http://schemas.openxmlformats.org/officeDocument/2006/relationships" xmlns:p="http://schemas.openxmlformats.org/presentationml/2006/main">
   <p:cSld>
@@ -18021,6 +18020,137 @@
             </a:r>
             <a:r>
               <a:rPr lang="fr-CH" dirty="0" err="1" smtClean="0"/>
+              <a:t>rebase</a:t>
+            </a:r>
+            <a:r>
+              <a:rPr lang="fr-CH" dirty="0" smtClean="0"/>
+              <a:t> -i</a:t>
+            </a:r>
+            <a:endParaRPr lang="fr-CH" dirty="0"/>
+          </a:p>
+        </p:txBody>
+      </p:sp>
+      <p:sp>
+        <p:nvSpPr>
+          <p:cNvPr id="3" name="Espace réservé du contenu 2"/>
+          <p:cNvSpPr>
+            <a:spLocks noGrp="1"/>
+          </p:cNvSpPr>
+          <p:nvPr>
+            <p:ph idx="1"/>
+          </p:nvPr>
+        </p:nvSpPr>
+        <p:spPr>
+          <a:xfrm>
+            <a:off x="950384" y="1572097"/>
+            <a:ext cx="10281992" cy="4367384"/>
+          </a:xfrm>
+        </p:spPr>
+        <p:txBody>
+          <a:bodyPr>
+            <a:normAutofit/>
+          </a:bodyPr>
+          <a:lstStyle/>
+          <a:p>
+            <a:r>
+              <a:rPr lang="fr-CH" dirty="0" smtClean="0"/>
+              <a:t>Essayez de séparer un commit en plusieurs </a:t>
+            </a:r>
+            <a:r>
+              <a:rPr lang="fr-CH" dirty="0" err="1" smtClean="0"/>
+              <a:t>commits</a:t>
+            </a:r>
+            <a:r>
+              <a:rPr lang="fr-CH" dirty="0" smtClean="0"/>
+              <a:t> (cas d’un commit trop gros ou mélange de deux correctifs)</a:t>
+            </a:r>
+            <a:endParaRPr lang="fr-CH" dirty="0"/>
+          </a:p>
+          <a:p>
+            <a:pPr lvl="1"/>
+            <a:r>
+              <a:rPr lang="fr-CH" dirty="0" smtClean="0"/>
+              <a:t>git </a:t>
+            </a:r>
+            <a:r>
+              <a:rPr lang="fr-CH" dirty="0" err="1" smtClean="0"/>
+              <a:t>rebase</a:t>
+            </a:r>
+            <a:r>
+              <a:rPr lang="fr-CH" dirty="0" smtClean="0"/>
+              <a:t>, git reset, git </a:t>
+            </a:r>
+            <a:r>
+              <a:rPr lang="fr-CH" dirty="0" err="1" smtClean="0"/>
+              <a:t>add</a:t>
+            </a:r>
+            <a:r>
+              <a:rPr lang="fr-CH" dirty="0" smtClean="0"/>
+              <a:t>, git commit</a:t>
+            </a:r>
+          </a:p>
+          <a:p>
+            <a:endParaRPr lang="fr-CH" dirty="0"/>
+          </a:p>
+          <a:p>
+            <a:endParaRPr lang="fr-CH" dirty="0" smtClean="0"/>
+          </a:p>
+          <a:p>
+            <a:endParaRPr lang="fr-CH" dirty="0" smtClean="0"/>
+          </a:p>
+        </p:txBody>
+      </p:sp>
+    </p:spTree>
+    <p:extLst>
+      <p:ext uri="{BB962C8B-B14F-4D97-AF65-F5344CB8AC3E}">
+        <p14:creationId xmlns:p14="http://schemas.microsoft.com/office/powerpoint/2010/main" val="1475944714"/>
+      </p:ext>
+    </p:extLst>
+  </p:cSld>
+  <p:clrMapOvr>
+    <a:masterClrMapping/>
+  </p:clrMapOvr>
+</p:sld>
+</file>
+
+<file path=ppt/slides/slide36.xml><?xml version="1.0" encoding="utf-8"?>
+<p:sld xmlns:a="http://schemas.openxmlformats.org/drawingml/2006/main" xmlns:r="http://schemas.openxmlformats.org/officeDocument/2006/relationships" xmlns:p="http://schemas.openxmlformats.org/presentationml/2006/main">
+  <p:cSld>
+    <p:spTree>
+      <p:nvGrpSpPr>
+        <p:cNvPr id="1" name=""/>
+        <p:cNvGrpSpPr/>
+        <p:nvPr/>
+      </p:nvGrpSpPr>
+      <p:grpSpPr>
+        <a:xfrm>
+          <a:off x="0" y="0"/>
+          <a:ext cx="0" cy="0"/>
+          <a:chOff x="0" y="0"/>
+          <a:chExt cx="0" cy="0"/>
+        </a:xfrm>
+      </p:grpSpPr>
+      <p:sp>
+        <p:nvSpPr>
+          <p:cNvPr id="2" name="Titre 1"/>
+          <p:cNvSpPr>
+            <a:spLocks noGrp="1"/>
+          </p:cNvSpPr>
+          <p:nvPr>
+            <p:ph type="title"/>
+          </p:nvPr>
+        </p:nvSpPr>
+        <p:spPr/>
+        <p:txBody>
+          <a:bodyPr/>
+          <a:lstStyle/>
+          <a:p>
+            <a:r>
+              <a:rPr lang="fr-CH" dirty="0" smtClean="0"/>
+              <a:t>git </a:t>
+            </a:r>
+            <a:r>
+              <a:rPr lang="fr-CH" dirty="0" err="1" smtClean="0"/>
               <a:t>filter-branch</a:t>
             </a:r>
             <a:endParaRPr lang="fr-CH" dirty="0"/>
@@ -18116,7 +18246,7 @@
 </p:sld>
 </file>
 
-<file path=ppt/slides/slide36.xml><?xml version="1.0" encoding="utf-8"?>
+<file path=ppt/slides/slide37.xml><?xml version="1.0" encoding="utf-8"?>
 <p:sld xmlns:a="http://schemas.openxmlformats.org/drawingml/2006/main" xmlns:r="http://schemas.openxmlformats.org/officeDocument/2006/relationships" xmlns:p="http://schemas.openxmlformats.org/presentationml/2006/main">
   <p:cSld>
     <p:spTree>
@@ -18215,7 +18345,7 @@
 </p:sld>
 </file>
 
-<file path=ppt/slides/slide37.xml><?xml version="1.0" encoding="utf-8"?>
+<file path=ppt/slides/slide38.xml><?xml version="1.0" encoding="utf-8"?>
 <p:sld xmlns:a="http://schemas.openxmlformats.org/drawingml/2006/main" xmlns:r="http://schemas.openxmlformats.org/officeDocument/2006/relationships" xmlns:p="http://schemas.openxmlformats.org/presentationml/2006/main">
   <p:cSld>
     <p:spTree>
@@ -18320,235 +18450,6 @@
 </p:sld>
 </file>
 
-<file path=ppt/slides/slide38.xml><?xml version="1.0" encoding="utf-8"?>
-<p:sld xmlns:a="http://schemas.openxmlformats.org/drawingml/2006/main" xmlns:r="http://schemas.openxmlformats.org/officeDocument/2006/relationships" xmlns:p="http://schemas.openxmlformats.org/presentationml/2006/main">
-  <p:cSld>
-    <p:spTree>
-      <p:nvGrpSpPr>
-        <p:cNvPr id="1" name=""/>
-        <p:cNvGrpSpPr/>
-        <p:nvPr/>
-      </p:nvGrpSpPr>
-      <p:grpSpPr>
-        <a:xfrm>
-          <a:off x="0" y="0"/>
-          <a:ext cx="0" cy="0"/>
-          <a:chOff x="0" y="0"/>
-          <a:chExt cx="0" cy="0"/>
-        </a:xfrm>
-      </p:grpSpPr>
-      <p:sp>
-        <p:nvSpPr>
-          <p:cNvPr id="2" name="Titre 1"/>
-          <p:cNvSpPr>
-            <a:spLocks noGrp="1"/>
-          </p:cNvSpPr>
-          <p:nvPr>
-            <p:ph type="title"/>
-          </p:nvPr>
-        </p:nvSpPr>
-        <p:spPr/>
-        <p:txBody>
-          <a:bodyPr/>
-          <a:lstStyle/>
-          <a:p>
-            <a:r>
-              <a:rPr lang="fr-CH" dirty="0" smtClean="0"/>
-              <a:t>Un </a:t>
-            </a:r>
-            <a:r>
-              <a:rPr lang="fr-CH" dirty="0" err="1" smtClean="0"/>
-              <a:t>hook</a:t>
-            </a:r>
-            <a:r>
-              <a:rPr lang="fr-CH" dirty="0" smtClean="0"/>
-              <a:t>, pourquoi faire ?</a:t>
-            </a:r>
-            <a:endParaRPr lang="fr-CH" dirty="0"/>
-          </a:p>
-        </p:txBody>
-      </p:sp>
-      <p:sp>
-        <p:nvSpPr>
-          <p:cNvPr id="3" name="Espace réservé du contenu 2"/>
-          <p:cNvSpPr>
-            <a:spLocks noGrp="1"/>
-          </p:cNvSpPr>
-          <p:nvPr>
-            <p:ph idx="1"/>
-          </p:nvPr>
-        </p:nvSpPr>
-        <p:spPr/>
-        <p:txBody>
-          <a:bodyPr>
-            <a:normAutofit fontScale="92500" lnSpcReduction="10000"/>
-          </a:bodyPr>
-          <a:lstStyle/>
-          <a:p>
-            <a:r>
-              <a:rPr lang="fr-CH" dirty="0"/>
-              <a:t>Un </a:t>
-            </a:r>
-            <a:r>
-              <a:rPr lang="fr-CH" dirty="0" err="1"/>
-              <a:t>hook</a:t>
-            </a:r>
-            <a:r>
-              <a:rPr lang="fr-CH" dirty="0"/>
-              <a:t> est un script qui s'exécute dès qu’un événement particulier se </a:t>
-            </a:r>
-            <a:r>
-              <a:rPr lang="fr-CH" dirty="0" smtClean="0"/>
-              <a:t>produit dans </a:t>
-            </a:r>
-            <a:r>
-              <a:rPr lang="fr-CH" dirty="0"/>
-              <a:t>un repo. </a:t>
-            </a:r>
-            <a:r>
-              <a:rPr lang="fr-CH" dirty="0" smtClean="0"/>
-              <a:t>git.</a:t>
-            </a:r>
-          </a:p>
-          <a:p>
-            <a:pPr lvl="1"/>
-            <a:r>
-              <a:rPr lang="fr-CH" dirty="0" smtClean="0"/>
-              <a:t>Dans </a:t>
-            </a:r>
-            <a:r>
-              <a:rPr lang="fr-CH" dirty="0" err="1"/>
-              <a:t>gitlab</a:t>
-            </a:r>
-            <a:r>
-              <a:rPr lang="fr-CH" dirty="0"/>
-              <a:t>, ce sont les </a:t>
-            </a:r>
-            <a:r>
-              <a:rPr lang="fr-CH" dirty="0" err="1"/>
-              <a:t>webhooks</a:t>
-            </a:r>
-            <a:r>
-              <a:rPr lang="fr-CH" dirty="0"/>
-              <a:t> qui sont responsables de lancer </a:t>
-            </a:r>
-            <a:r>
-              <a:rPr lang="fr-CH" dirty="0" smtClean="0"/>
-              <a:t>une action.</a:t>
-            </a:r>
-          </a:p>
-          <a:p>
-            <a:r>
-              <a:rPr lang="fr-CH" dirty="0"/>
-              <a:t>Cas d’utilisation :</a:t>
-            </a:r>
-          </a:p>
-          <a:p>
-            <a:pPr lvl="1"/>
-            <a:r>
-              <a:rPr lang="fr-CH" dirty="0" err="1" smtClean="0"/>
-              <a:t>hooks</a:t>
-            </a:r>
-            <a:r>
-              <a:rPr lang="fr-CH" dirty="0" smtClean="0"/>
-              <a:t> </a:t>
-            </a:r>
-            <a:r>
-              <a:rPr lang="fr-CH" dirty="0"/>
-              <a:t>côté serveur</a:t>
-            </a:r>
-          </a:p>
-          <a:p>
-            <a:pPr lvl="2"/>
-            <a:r>
-              <a:rPr lang="fr-CH" dirty="0" smtClean="0"/>
-              <a:t>mise </a:t>
-            </a:r>
-            <a:r>
-              <a:rPr lang="fr-CH" dirty="0"/>
-              <a:t>en place d’une stratégie de commit</a:t>
-            </a:r>
-          </a:p>
-          <a:p>
-            <a:pPr lvl="2"/>
-            <a:r>
-              <a:rPr lang="fr-CH" dirty="0" smtClean="0"/>
-              <a:t>workflows </a:t>
-            </a:r>
-            <a:r>
-              <a:rPr lang="fr-CH" dirty="0"/>
-              <a:t>d’intégration continue</a:t>
-            </a:r>
-          </a:p>
-          <a:p>
-            <a:pPr lvl="2"/>
-            <a:r>
-              <a:rPr lang="fr-CH" dirty="0" smtClean="0"/>
-              <a:t>publication </a:t>
-            </a:r>
-            <a:r>
-              <a:rPr lang="fr-CH" dirty="0"/>
-              <a:t>des notifications sur un </a:t>
-            </a:r>
-            <a:r>
-              <a:rPr lang="fr-CH" dirty="0" err="1"/>
-              <a:t>channel</a:t>
-            </a:r>
-            <a:r>
-              <a:rPr lang="fr-CH" dirty="0"/>
-              <a:t> </a:t>
-            </a:r>
-            <a:r>
-              <a:rPr lang="fr-CH" dirty="0" err="1" smtClean="0"/>
-              <a:t>Mattermost</a:t>
-            </a:r>
-            <a:endParaRPr lang="fr-CH" dirty="0"/>
-          </a:p>
-          <a:p>
-            <a:pPr lvl="1"/>
-            <a:r>
-              <a:rPr lang="fr-CH" dirty="0" err="1" smtClean="0"/>
-              <a:t>hooks</a:t>
-            </a:r>
-            <a:r>
-              <a:rPr lang="fr-CH" dirty="0" smtClean="0"/>
-              <a:t> </a:t>
-            </a:r>
-            <a:r>
-              <a:rPr lang="fr-CH" dirty="0"/>
-              <a:t>en </a:t>
-            </a:r>
-            <a:r>
-              <a:rPr lang="fr-CH" dirty="0" smtClean="0"/>
-              <a:t>local</a:t>
-            </a:r>
-          </a:p>
-          <a:p>
-            <a:pPr lvl="2"/>
-            <a:r>
-              <a:rPr lang="fr-CH" dirty="0" smtClean="0"/>
-              <a:t>script </a:t>
-            </a:r>
-            <a:r>
-              <a:rPr lang="fr-CH" dirty="0"/>
-              <a:t>spécifique</a:t>
-            </a:r>
-          </a:p>
-        </p:txBody>
-      </p:sp>
-    </p:spTree>
-    <p:extLst>
-      <p:ext uri="{BB962C8B-B14F-4D97-AF65-F5344CB8AC3E}">
-        <p14:creationId xmlns:p14="http://schemas.microsoft.com/office/powerpoint/2010/main" val="1332524225"/>
-      </p:ext>
-    </p:extLst>
-  </p:cSld>
-  <p:clrMapOvr>
-    <a:masterClrMapping/>
-  </p:clrMapOvr>
-</p:sld>
-</file>
-
 <file path=ppt/slides/slide39.xml><?xml version="1.0" encoding="utf-8"?>
 <p:sld xmlns:a="http://schemas.openxmlformats.org/drawingml/2006/main" xmlns:r="http://schemas.openxmlformats.org/officeDocument/2006/relationships" xmlns:p="http://schemas.openxmlformats.org/presentationml/2006/main">
   <p:cSld>
@@ -18582,6 +18483,389 @@
           <a:lstStyle/>
           <a:p>
             <a:r>
+              <a:rPr lang="fr-CH" dirty="0" smtClean="0"/>
+              <a:t>Un </a:t>
+            </a:r>
+            <a:r>
+              <a:rPr lang="fr-CH" dirty="0" err="1" smtClean="0"/>
+              <a:t>hook</a:t>
+            </a:r>
+            <a:r>
+              <a:rPr lang="fr-CH" dirty="0" smtClean="0"/>
+              <a:t>, pourquoi faire ?</a:t>
+            </a:r>
+            <a:endParaRPr lang="fr-CH" dirty="0"/>
+          </a:p>
+        </p:txBody>
+      </p:sp>
+      <p:sp>
+        <p:nvSpPr>
+          <p:cNvPr id="3" name="Espace réservé du contenu 2"/>
+          <p:cNvSpPr>
+            <a:spLocks noGrp="1"/>
+          </p:cNvSpPr>
+          <p:nvPr>
+            <p:ph idx="1"/>
+          </p:nvPr>
+        </p:nvSpPr>
+        <p:spPr/>
+        <p:txBody>
+          <a:bodyPr>
+            <a:normAutofit fontScale="92500" lnSpcReduction="10000"/>
+          </a:bodyPr>
+          <a:lstStyle/>
+          <a:p>
+            <a:r>
+              <a:rPr lang="fr-CH" dirty="0"/>
+              <a:t>Un </a:t>
+            </a:r>
+            <a:r>
+              <a:rPr lang="fr-CH" dirty="0" err="1"/>
+              <a:t>hook</a:t>
+            </a:r>
+            <a:r>
+              <a:rPr lang="fr-CH" dirty="0"/>
+              <a:t> est un script qui s'exécute dès qu’un événement particulier se </a:t>
+            </a:r>
+            <a:r>
+              <a:rPr lang="fr-CH" dirty="0" smtClean="0"/>
+              <a:t>produit dans </a:t>
+            </a:r>
+            <a:r>
+              <a:rPr lang="fr-CH" dirty="0"/>
+              <a:t>un repo. </a:t>
+            </a:r>
+            <a:r>
+              <a:rPr lang="fr-CH" dirty="0" smtClean="0"/>
+              <a:t>git.</a:t>
+            </a:r>
+          </a:p>
+          <a:p>
+            <a:pPr lvl="1"/>
+            <a:r>
+              <a:rPr lang="fr-CH" dirty="0" smtClean="0"/>
+              <a:t>Dans </a:t>
+            </a:r>
+            <a:r>
+              <a:rPr lang="fr-CH" dirty="0" err="1"/>
+              <a:t>gitlab</a:t>
+            </a:r>
+            <a:r>
+              <a:rPr lang="fr-CH" dirty="0"/>
+              <a:t>, ce sont les </a:t>
+            </a:r>
+            <a:r>
+              <a:rPr lang="fr-CH" dirty="0" err="1"/>
+              <a:t>webhooks</a:t>
+            </a:r>
+            <a:r>
+              <a:rPr lang="fr-CH" dirty="0"/>
+              <a:t> qui sont responsables de lancer </a:t>
+            </a:r>
+            <a:r>
+              <a:rPr lang="fr-CH" dirty="0" smtClean="0"/>
+              <a:t>une action.</a:t>
+            </a:r>
+          </a:p>
+          <a:p>
+            <a:r>
+              <a:rPr lang="fr-CH" dirty="0"/>
+              <a:t>Cas d’utilisation :</a:t>
+            </a:r>
+          </a:p>
+          <a:p>
+            <a:pPr lvl="1"/>
+            <a:r>
+              <a:rPr lang="fr-CH" dirty="0" err="1" smtClean="0"/>
+              <a:t>hooks</a:t>
+            </a:r>
+            <a:r>
+              <a:rPr lang="fr-CH" dirty="0" smtClean="0"/>
+              <a:t> </a:t>
+            </a:r>
+            <a:r>
+              <a:rPr lang="fr-CH" dirty="0"/>
+              <a:t>côté serveur</a:t>
+            </a:r>
+          </a:p>
+          <a:p>
+            <a:pPr lvl="2"/>
+            <a:r>
+              <a:rPr lang="fr-CH" dirty="0" smtClean="0"/>
+              <a:t>mise </a:t>
+            </a:r>
+            <a:r>
+              <a:rPr lang="fr-CH" dirty="0"/>
+              <a:t>en place d’une stratégie de commit</a:t>
+            </a:r>
+          </a:p>
+          <a:p>
+            <a:pPr lvl="2"/>
+            <a:r>
+              <a:rPr lang="fr-CH" dirty="0" smtClean="0"/>
+              <a:t>workflows </a:t>
+            </a:r>
+            <a:r>
+              <a:rPr lang="fr-CH" dirty="0"/>
+              <a:t>d’intégration continue</a:t>
+            </a:r>
+          </a:p>
+          <a:p>
+            <a:pPr lvl="2"/>
+            <a:r>
+              <a:rPr lang="fr-CH" dirty="0" smtClean="0"/>
+              <a:t>publication </a:t>
+            </a:r>
+            <a:r>
+              <a:rPr lang="fr-CH" dirty="0"/>
+              <a:t>des notifications sur un </a:t>
+            </a:r>
+            <a:r>
+              <a:rPr lang="fr-CH" dirty="0" err="1"/>
+              <a:t>channel</a:t>
+            </a:r>
+            <a:r>
+              <a:rPr lang="fr-CH" dirty="0"/>
+              <a:t> </a:t>
+            </a:r>
+            <a:r>
+              <a:rPr lang="fr-CH" dirty="0" err="1" smtClean="0"/>
+              <a:t>Mattermost</a:t>
+            </a:r>
+            <a:endParaRPr lang="fr-CH" dirty="0"/>
+          </a:p>
+          <a:p>
+            <a:pPr lvl="1"/>
+            <a:r>
+              <a:rPr lang="fr-CH" dirty="0" err="1" smtClean="0"/>
+              <a:t>hooks</a:t>
+            </a:r>
+            <a:r>
+              <a:rPr lang="fr-CH" dirty="0" smtClean="0"/>
+              <a:t> </a:t>
+            </a:r>
+            <a:r>
+              <a:rPr lang="fr-CH" dirty="0"/>
+              <a:t>en </a:t>
+            </a:r>
+            <a:r>
+              <a:rPr lang="fr-CH" dirty="0" smtClean="0"/>
+              <a:t>local</a:t>
+            </a:r>
+          </a:p>
+          <a:p>
+            <a:pPr lvl="2"/>
+            <a:r>
+              <a:rPr lang="fr-CH" dirty="0" smtClean="0"/>
+              <a:t>script </a:t>
+            </a:r>
+            <a:r>
+              <a:rPr lang="fr-CH" dirty="0"/>
+              <a:t>spécifique</a:t>
+            </a:r>
+          </a:p>
+        </p:txBody>
+      </p:sp>
+    </p:spTree>
+    <p:extLst>
+      <p:ext uri="{BB962C8B-B14F-4D97-AF65-F5344CB8AC3E}">
+        <p14:creationId xmlns:p14="http://schemas.microsoft.com/office/powerpoint/2010/main" val="1332524225"/>
+      </p:ext>
+    </p:extLst>
+  </p:cSld>
+  <p:clrMapOvr>
+    <a:masterClrMapping/>
+  </p:clrMapOvr>
+</p:sld>
+</file>
+
+<file path=ppt/slides/slide4.xml><?xml version="1.0" encoding="utf-8"?>
+<p:sld xmlns:a="http://schemas.openxmlformats.org/drawingml/2006/main" xmlns:r="http://schemas.openxmlformats.org/officeDocument/2006/relationships" xmlns:p="http://schemas.openxmlformats.org/presentationml/2006/main">
+  <p:cSld>
+    <p:spTree>
+      <p:nvGrpSpPr>
+        <p:cNvPr id="1" name=""/>
+        <p:cNvGrpSpPr/>
+        <p:nvPr/>
+      </p:nvGrpSpPr>
+      <p:grpSpPr>
+        <a:xfrm>
+          <a:off x="0" y="0"/>
+          <a:ext cx="0" cy="0"/>
+          <a:chOff x="0" y="0"/>
+          <a:chExt cx="0" cy="0"/>
+        </a:xfrm>
+      </p:grpSpPr>
+      <p:sp>
+        <p:nvSpPr>
+          <p:cNvPr id="2" name="Titre 1"/>
+          <p:cNvSpPr>
+            <a:spLocks noGrp="1"/>
+          </p:cNvSpPr>
+          <p:nvPr>
+            <p:ph type="title"/>
+          </p:nvPr>
+        </p:nvSpPr>
+        <p:spPr/>
+        <p:txBody>
+          <a:bodyPr/>
+          <a:lstStyle/>
+          <a:p>
+            <a:r>
+              <a:rPr lang="fr-FR" dirty="0" smtClean="0"/>
+              <a:t>L’architecture</a:t>
+            </a:r>
+            <a:endParaRPr lang="fr-CH" dirty="0"/>
+          </a:p>
+        </p:txBody>
+      </p:sp>
+      <p:sp>
+        <p:nvSpPr>
+          <p:cNvPr id="3" name="Espace réservé du contenu 2"/>
+          <p:cNvSpPr>
+            <a:spLocks noGrp="1"/>
+          </p:cNvSpPr>
+          <p:nvPr>
+            <p:ph idx="1"/>
+          </p:nvPr>
+        </p:nvSpPr>
+        <p:spPr>
+          <a:xfrm>
+            <a:off x="950384" y="1555242"/>
+            <a:ext cx="10281992" cy="3619041"/>
+          </a:xfrm>
+        </p:spPr>
+        <p:txBody>
+          <a:bodyPr>
+            <a:normAutofit/>
+          </a:bodyPr>
+          <a:lstStyle/>
+          <a:p>
+            <a:r>
+              <a:rPr lang="fr-FR" dirty="0" smtClean="0"/>
+              <a:t>Le répertoire .git contient toutes les informations nécessaire au fonctionnement du </a:t>
+            </a:r>
+            <a:r>
+              <a:rPr lang="fr-FR" dirty="0" err="1" smtClean="0"/>
+              <a:t>dépot</a:t>
+            </a:r>
+            <a:endParaRPr lang="fr-FR" dirty="0" smtClean="0"/>
+          </a:p>
+          <a:p>
+            <a:r>
+              <a:rPr lang="fr-FR" dirty="0" smtClean="0"/>
+              <a:t>Contient les répertoires suivants</a:t>
+            </a:r>
+          </a:p>
+          <a:p>
+            <a:pPr lvl="1"/>
+            <a:r>
+              <a:rPr lang="fr-FR" dirty="0" err="1" smtClean="0"/>
+              <a:t>Hooks</a:t>
+            </a:r>
+            <a:r>
+              <a:rPr lang="fr-FR" dirty="0" smtClean="0"/>
+              <a:t> -&gt; permet de stocker les scripts de </a:t>
+            </a:r>
+            <a:r>
+              <a:rPr lang="fr-FR" dirty="0" err="1" smtClean="0"/>
+              <a:t>hook</a:t>
+            </a:r>
+            <a:endParaRPr lang="fr-FR" dirty="0" smtClean="0"/>
+          </a:p>
+          <a:p>
+            <a:pPr lvl="1"/>
+            <a:r>
+              <a:rPr lang="fr-FR" dirty="0" smtClean="0"/>
+              <a:t>Logs -&gt; logs des différentes opérations effectuées avec git</a:t>
+            </a:r>
+          </a:p>
+          <a:p>
+            <a:pPr lvl="1"/>
+            <a:r>
+              <a:rPr lang="fr-FR" dirty="0" err="1" smtClean="0"/>
+              <a:t>Objects</a:t>
+            </a:r>
+            <a:r>
+              <a:rPr lang="fr-FR" dirty="0" smtClean="0"/>
+              <a:t> -&gt; contient (entre autre) les </a:t>
+            </a:r>
+            <a:r>
+              <a:rPr lang="fr-FR" dirty="0" err="1" smtClean="0"/>
+              <a:t>commits</a:t>
+            </a:r>
+            <a:endParaRPr lang="fr-FR" dirty="0" smtClean="0"/>
+          </a:p>
+          <a:p>
+            <a:pPr lvl="1"/>
+            <a:r>
+              <a:rPr lang="fr-FR" dirty="0" err="1" smtClean="0"/>
+              <a:t>Refs</a:t>
+            </a:r>
+            <a:r>
+              <a:rPr lang="fr-FR" dirty="0" smtClean="0"/>
+              <a:t> -&gt; contient les étiquettes  </a:t>
+            </a:r>
+          </a:p>
+          <a:p>
+            <a:r>
+              <a:rPr lang="fr-CH" dirty="0" smtClean="0"/>
+              <a:t>Le fonctionnement interne de git est basé que sur les </a:t>
+            </a:r>
+            <a:r>
+              <a:rPr lang="fr-CH" dirty="0" err="1" smtClean="0"/>
+              <a:t>objects</a:t>
+            </a:r>
+            <a:endParaRPr lang="fr-FR" dirty="0"/>
+          </a:p>
+        </p:txBody>
+      </p:sp>
+    </p:spTree>
+    <p:extLst>
+      <p:ext uri="{BB962C8B-B14F-4D97-AF65-F5344CB8AC3E}">
+        <p14:creationId xmlns:p14="http://schemas.microsoft.com/office/powerpoint/2010/main" val="1697854684"/>
+      </p:ext>
+    </p:extLst>
+  </p:cSld>
+  <p:clrMapOvr>
+    <a:masterClrMapping/>
+  </p:clrMapOvr>
+</p:sld>
+</file>
+
+<file path=ppt/slides/slide40.xml><?xml version="1.0" encoding="utf-8"?>
+<p:sld xmlns:a="http://schemas.openxmlformats.org/drawingml/2006/main" xmlns:r="http://schemas.openxmlformats.org/officeDocument/2006/relationships" xmlns:p="http://schemas.openxmlformats.org/presentationml/2006/main">
+  <p:cSld>
+    <p:spTree>
+      <p:nvGrpSpPr>
+        <p:cNvPr id="1" name=""/>
+        <p:cNvGrpSpPr/>
+        <p:nvPr/>
+      </p:nvGrpSpPr>
+      <p:grpSpPr>
+        <a:xfrm>
+          <a:off x="0" y="0"/>
+          <a:ext cx="0" cy="0"/>
+          <a:chOff x="0" y="0"/>
+          <a:chExt cx="0" cy="0"/>
+        </a:xfrm>
+      </p:grpSpPr>
+      <p:sp>
+        <p:nvSpPr>
+          <p:cNvPr id="2" name="Titre 1"/>
+          <p:cNvSpPr>
+            <a:spLocks noGrp="1"/>
+          </p:cNvSpPr>
+          <p:nvPr>
+            <p:ph type="title"/>
+          </p:nvPr>
+        </p:nvSpPr>
+        <p:spPr/>
+        <p:txBody>
+          <a:bodyPr/>
+          <a:lstStyle/>
+          <a:p>
+            <a:r>
               <a:rPr lang="fr-CH" b="1" dirty="0"/>
               <a:t>Les types de </a:t>
             </a:r>
@@ -18863,7 +19147,147 @@
 </p:sld>
 </file>
 
-<file path=ppt/slides/slide4.xml><?xml version="1.0" encoding="utf-8"?>
+<file path=ppt/slides/slide41.xml><?xml version="1.0" encoding="utf-8"?>
+<p:sld xmlns:a="http://schemas.openxmlformats.org/drawingml/2006/main" xmlns:r="http://schemas.openxmlformats.org/officeDocument/2006/relationships" xmlns:p="http://schemas.openxmlformats.org/presentationml/2006/main">
+  <p:cSld>
+    <p:spTree>
+      <p:nvGrpSpPr>
+        <p:cNvPr id="1" name=""/>
+        <p:cNvGrpSpPr/>
+        <p:nvPr/>
+      </p:nvGrpSpPr>
+      <p:grpSpPr>
+        <a:xfrm>
+          <a:off x="0" y="0"/>
+          <a:ext cx="0" cy="0"/>
+          <a:chOff x="0" y="0"/>
+          <a:chExt cx="0" cy="0"/>
+        </a:xfrm>
+      </p:grpSpPr>
+      <p:sp>
+        <p:nvSpPr>
+          <p:cNvPr id="2" name="Titre 1"/>
+          <p:cNvSpPr>
+            <a:spLocks noGrp="1"/>
+          </p:cNvSpPr>
+          <p:nvPr>
+            <p:ph type="title"/>
+          </p:nvPr>
+        </p:nvSpPr>
+        <p:spPr/>
+        <p:txBody>
+          <a:bodyPr/>
+          <a:lstStyle/>
+          <a:p>
+            <a:r>
+              <a:rPr lang="fr-CH" dirty="0" smtClean="0"/>
+              <a:t>Où sont les </a:t>
+            </a:r>
+            <a:r>
+              <a:rPr lang="fr-CH" dirty="0" err="1" smtClean="0"/>
+              <a:t>hooks</a:t>
+            </a:r>
+            <a:r>
+              <a:rPr lang="fr-CH" dirty="0" smtClean="0"/>
+              <a:t> ?</a:t>
+            </a:r>
+            <a:endParaRPr lang="fr-CH" dirty="0"/>
+          </a:p>
+        </p:txBody>
+      </p:sp>
+      <p:sp>
+        <p:nvSpPr>
+          <p:cNvPr id="3" name="Espace réservé du contenu 2"/>
+          <p:cNvSpPr>
+            <a:spLocks noGrp="1"/>
+          </p:cNvSpPr>
+          <p:nvPr>
+            <p:ph idx="1"/>
+          </p:nvPr>
+        </p:nvSpPr>
+        <p:spPr/>
+        <p:txBody>
+          <a:bodyPr/>
+          <a:lstStyle/>
+          <a:p>
+            <a:r>
+              <a:rPr lang="fr-CH" dirty="0" smtClean="0"/>
+              <a:t>Regarder les exemples de .git/</a:t>
+            </a:r>
+            <a:r>
+              <a:rPr lang="fr-CH" dirty="0" err="1" smtClean="0"/>
+              <a:t>hooks</a:t>
+            </a:r>
+            <a:endParaRPr lang="fr-CH" dirty="0" smtClean="0"/>
+          </a:p>
+          <a:p>
+            <a:pPr lvl="1"/>
+            <a:r>
+              <a:rPr lang="fr-CH" dirty="0" err="1" smtClean="0"/>
+              <a:t>Pre</a:t>
+            </a:r>
+            <a:r>
+              <a:rPr lang="fr-CH" dirty="0" smtClean="0"/>
+              <a:t>-commit : lancement de tests, …</a:t>
+            </a:r>
+          </a:p>
+          <a:p>
+            <a:pPr lvl="1"/>
+            <a:r>
+              <a:rPr lang="fr-CH" dirty="0" err="1" smtClean="0"/>
+              <a:t>Prepare</a:t>
+            </a:r>
+            <a:r>
+              <a:rPr lang="fr-CH" dirty="0" smtClean="0"/>
+              <a:t>-commit-message : modifier les messages de </a:t>
+            </a:r>
+            <a:r>
+              <a:rPr lang="fr-CH" dirty="0" err="1" smtClean="0"/>
+              <a:t>commits</a:t>
+            </a:r>
+            <a:r>
+              <a:rPr lang="fr-CH" dirty="0" smtClean="0"/>
+              <a:t> (préfixe en fonction du nom de la branche, …)</a:t>
+            </a:r>
+          </a:p>
+          <a:p>
+            <a:pPr lvl="1"/>
+            <a:r>
+              <a:rPr lang="fr-CH" dirty="0" smtClean="0"/>
+              <a:t>Commit-</a:t>
+            </a:r>
+            <a:r>
+              <a:rPr lang="fr-CH" dirty="0" err="1" smtClean="0"/>
+              <a:t>msg</a:t>
+            </a:r>
+            <a:r>
+              <a:rPr lang="fr-CH" dirty="0" smtClean="0"/>
+              <a:t> : vérification du message de commit, …</a:t>
+            </a:r>
+          </a:p>
+          <a:p>
+            <a:pPr lvl="1"/>
+            <a:r>
+              <a:rPr lang="fr-CH" dirty="0" smtClean="0"/>
+              <a:t>Post-commit : notifications, envoie de mail, …</a:t>
+            </a:r>
+          </a:p>
+        </p:txBody>
+      </p:sp>
+    </p:spTree>
+    <p:extLst>
+      <p:ext uri="{BB962C8B-B14F-4D97-AF65-F5344CB8AC3E}">
+        <p14:creationId xmlns:p14="http://schemas.microsoft.com/office/powerpoint/2010/main" val="1749906507"/>
+      </p:ext>
+    </p:extLst>
+  </p:cSld>
+  <p:clrMapOvr>
+    <a:masterClrMapping/>
+  </p:clrMapOvr>
+</p:sld>
+</file>
+
+<file path=ppt/slides/slide5.xml><?xml version="1.0" encoding="utf-8"?>
 <p:sld xmlns:a="http://schemas.openxmlformats.org/drawingml/2006/main" xmlns:r="http://schemas.openxmlformats.org/officeDocument/2006/relationships" xmlns:p="http://schemas.openxmlformats.org/presentationml/2006/main">
   <p:cSld>
     <p:spTree>
@@ -19007,147 +19431,7 @@
 </p:sld>
 </file>
 
-<file path=ppt/slides/slide40.xml><?xml version="1.0" encoding="utf-8"?>
-<p:sld xmlns:a="http://schemas.openxmlformats.org/drawingml/2006/main" xmlns:r="http://schemas.openxmlformats.org/officeDocument/2006/relationships" xmlns:p="http://schemas.openxmlformats.org/presentationml/2006/main">
-  <p:cSld>
-    <p:spTree>
-      <p:nvGrpSpPr>
-        <p:cNvPr id="1" name=""/>
-        <p:cNvGrpSpPr/>
-        <p:nvPr/>
-      </p:nvGrpSpPr>
-      <p:grpSpPr>
-        <a:xfrm>
-          <a:off x="0" y="0"/>
-          <a:ext cx="0" cy="0"/>
-          <a:chOff x="0" y="0"/>
-          <a:chExt cx="0" cy="0"/>
-        </a:xfrm>
-      </p:grpSpPr>
-      <p:sp>
-        <p:nvSpPr>
-          <p:cNvPr id="2" name="Titre 1"/>
-          <p:cNvSpPr>
-            <a:spLocks noGrp="1"/>
-          </p:cNvSpPr>
-          <p:nvPr>
-            <p:ph type="title"/>
-          </p:nvPr>
-        </p:nvSpPr>
-        <p:spPr/>
-        <p:txBody>
-          <a:bodyPr/>
-          <a:lstStyle/>
-          <a:p>
-            <a:r>
-              <a:rPr lang="fr-CH" dirty="0" smtClean="0"/>
-              <a:t>Où sont les </a:t>
-            </a:r>
-            <a:r>
-              <a:rPr lang="fr-CH" dirty="0" err="1" smtClean="0"/>
-              <a:t>hooks</a:t>
-            </a:r>
-            <a:r>
-              <a:rPr lang="fr-CH" dirty="0" smtClean="0"/>
-              <a:t> ?</a:t>
-            </a:r>
-            <a:endParaRPr lang="fr-CH" dirty="0"/>
-          </a:p>
-        </p:txBody>
-      </p:sp>
-      <p:sp>
-        <p:nvSpPr>
-          <p:cNvPr id="3" name="Espace réservé du contenu 2"/>
-          <p:cNvSpPr>
-            <a:spLocks noGrp="1"/>
-          </p:cNvSpPr>
-          <p:nvPr>
-            <p:ph idx="1"/>
-          </p:nvPr>
-        </p:nvSpPr>
-        <p:spPr/>
-        <p:txBody>
-          <a:bodyPr/>
-          <a:lstStyle/>
-          <a:p>
-            <a:r>
-              <a:rPr lang="fr-CH" dirty="0" smtClean="0"/>
-              <a:t>Regarder les exemples de .git/</a:t>
-            </a:r>
-            <a:r>
-              <a:rPr lang="fr-CH" dirty="0" err="1" smtClean="0"/>
-              <a:t>hooks</a:t>
-            </a:r>
-            <a:endParaRPr lang="fr-CH" dirty="0" smtClean="0"/>
-          </a:p>
-          <a:p>
-            <a:pPr lvl="1"/>
-            <a:r>
-              <a:rPr lang="fr-CH" dirty="0" err="1" smtClean="0"/>
-              <a:t>Pre</a:t>
-            </a:r>
-            <a:r>
-              <a:rPr lang="fr-CH" dirty="0" smtClean="0"/>
-              <a:t>-commit : lancement de tests, …</a:t>
-            </a:r>
-          </a:p>
-          <a:p>
-            <a:pPr lvl="1"/>
-            <a:r>
-              <a:rPr lang="fr-CH" dirty="0" err="1" smtClean="0"/>
-              <a:t>Prepare</a:t>
-            </a:r>
-            <a:r>
-              <a:rPr lang="fr-CH" dirty="0" smtClean="0"/>
-              <a:t>-commit-message : modifier les messages de </a:t>
-            </a:r>
-            <a:r>
-              <a:rPr lang="fr-CH" dirty="0" err="1" smtClean="0"/>
-              <a:t>commits</a:t>
-            </a:r>
-            <a:r>
-              <a:rPr lang="fr-CH" dirty="0" smtClean="0"/>
-              <a:t> (préfixe en fonction du nom de la branche, …)</a:t>
-            </a:r>
-          </a:p>
-          <a:p>
-            <a:pPr lvl="1"/>
-            <a:r>
-              <a:rPr lang="fr-CH" dirty="0" smtClean="0"/>
-              <a:t>Commit-</a:t>
-            </a:r>
-            <a:r>
-              <a:rPr lang="fr-CH" dirty="0" err="1" smtClean="0"/>
-              <a:t>msg</a:t>
-            </a:r>
-            <a:r>
-              <a:rPr lang="fr-CH" dirty="0" smtClean="0"/>
-              <a:t> : vérification du message de commit, …</a:t>
-            </a:r>
-          </a:p>
-          <a:p>
-            <a:pPr lvl="1"/>
-            <a:r>
-              <a:rPr lang="fr-CH" dirty="0" smtClean="0"/>
-              <a:t>Post-commit : notifications, envoie de mail, …</a:t>
-            </a:r>
-          </a:p>
-        </p:txBody>
-      </p:sp>
-    </p:spTree>
-    <p:extLst>
-      <p:ext uri="{BB962C8B-B14F-4D97-AF65-F5344CB8AC3E}">
-        <p14:creationId xmlns:p14="http://schemas.microsoft.com/office/powerpoint/2010/main" val="1749906507"/>
-      </p:ext>
-    </p:extLst>
-  </p:cSld>
-  <p:clrMapOvr>
-    <a:masterClrMapping/>
-  </p:clrMapOvr>
-</p:sld>
-</file>
-
-<file path=ppt/slides/slide5.xml><?xml version="1.0" encoding="utf-8"?>
+<file path=ppt/slides/slide6.xml><?xml version="1.0" encoding="utf-8"?>
 <p:sld xmlns:a="http://schemas.openxmlformats.org/drawingml/2006/main" xmlns:r="http://schemas.openxmlformats.org/officeDocument/2006/relationships" xmlns:p="http://schemas.openxmlformats.org/presentationml/2006/main">
   <p:cSld>
     <p:spTree>
@@ -19278,7 +19562,7 @@
 </p:sld>
 </file>
 
-<file path=ppt/slides/slide6.xml><?xml version="1.0" encoding="utf-8"?>
+<file path=ppt/slides/slide7.xml><?xml version="1.0" encoding="utf-8"?>
 <p:sld xmlns:a="http://schemas.openxmlformats.org/drawingml/2006/main" xmlns:r="http://schemas.openxmlformats.org/officeDocument/2006/relationships" xmlns:p="http://schemas.openxmlformats.org/presentationml/2006/main">
   <p:cSld>
     <p:spTree>
@@ -19378,7 +19662,7 @@
 </p:sld>
 </file>
 
-<file path=ppt/slides/slide7.xml><?xml version="1.0" encoding="utf-8"?>
+<file path=ppt/slides/slide8.xml><?xml version="1.0" encoding="utf-8"?>
 <p:sld xmlns:a="http://schemas.openxmlformats.org/drawingml/2006/main" xmlns:r="http://schemas.openxmlformats.org/officeDocument/2006/relationships" xmlns:p="http://schemas.openxmlformats.org/presentationml/2006/main">
   <p:cSld>
     <p:spTree>
@@ -19581,7 +19865,7 @@
 </p:sld>
 </file>
 
-<file path=ppt/slides/slide8.xml><?xml version="1.0" encoding="utf-8"?>
+<file path=ppt/slides/slide9.xml><?xml version="1.0" encoding="utf-8"?>
 <p:sld xmlns:a="http://schemas.openxmlformats.org/drawingml/2006/main" xmlns:r="http://schemas.openxmlformats.org/officeDocument/2006/relationships" xmlns:p="http://schemas.openxmlformats.org/presentationml/2006/main">
   <p:cSld>
     <p:spTree>
@@ -19773,227 +20057,6 @@
     <p:extLst>
       <p:ext uri="{BB962C8B-B14F-4D97-AF65-F5344CB8AC3E}">
         <p14:creationId xmlns:p14="http://schemas.microsoft.com/office/powerpoint/2010/main" val="2153305433"/>
-      </p:ext>
-    </p:extLst>
-  </p:cSld>
-  <p:clrMapOvr>
-    <a:masterClrMapping/>
-  </p:clrMapOvr>
-</p:sld>
-</file>
-
-<file path=ppt/slides/slide9.xml><?xml version="1.0" encoding="utf-8"?>
-<p:sld xmlns:a="http://schemas.openxmlformats.org/drawingml/2006/main" xmlns:r="http://schemas.openxmlformats.org/officeDocument/2006/relationships" xmlns:p="http://schemas.openxmlformats.org/presentationml/2006/main">
-  <p:cSld>
-    <p:spTree>
-      <p:nvGrpSpPr>
-        <p:cNvPr id="1" name=""/>
-        <p:cNvGrpSpPr/>
-        <p:nvPr/>
-      </p:nvGrpSpPr>
-      <p:grpSpPr>
-        <a:xfrm>
-          <a:off x="0" y="0"/>
-          <a:ext cx="0" cy="0"/>
-          <a:chOff x="0" y="0"/>
-          <a:chExt cx="0" cy="0"/>
-        </a:xfrm>
-      </p:grpSpPr>
-      <p:sp>
-        <p:nvSpPr>
-          <p:cNvPr id="2" name="Titre 1"/>
-          <p:cNvSpPr>
-            <a:spLocks noGrp="1"/>
-          </p:cNvSpPr>
-          <p:nvPr>
-            <p:ph type="title"/>
-          </p:nvPr>
-        </p:nvSpPr>
-        <p:spPr/>
-        <p:txBody>
-          <a:bodyPr/>
-          <a:lstStyle/>
-          <a:p>
-            <a:r>
-              <a:rPr lang="fr-FR" dirty="0" smtClean="0"/>
-              <a:t>Rapatrier les </a:t>
-            </a:r>
-            <a:r>
-              <a:rPr lang="fr-FR" dirty="0" err="1" smtClean="0"/>
-              <a:t>commits</a:t>
-            </a:r>
-            <a:r>
-              <a:rPr lang="fr-FR" dirty="0" smtClean="0"/>
-              <a:t> distants avec le </a:t>
-            </a:r>
-            <a:r>
-              <a:rPr lang="fr-FR" dirty="0" err="1" smtClean="0"/>
-              <a:t>rebase</a:t>
-            </a:r>
-            <a:endParaRPr lang="fr-CH" dirty="0"/>
-          </a:p>
-        </p:txBody>
-      </p:sp>
-      <p:sp>
-        <p:nvSpPr>
-          <p:cNvPr id="3" name="Espace réservé du contenu 2"/>
-          <p:cNvSpPr>
-            <a:spLocks noGrp="1"/>
-          </p:cNvSpPr>
-          <p:nvPr>
-            <p:ph idx="1"/>
-          </p:nvPr>
-        </p:nvSpPr>
-        <p:spPr/>
-        <p:txBody>
-          <a:bodyPr/>
-          <a:lstStyle/>
-          <a:p>
-            <a:r>
-              <a:rPr lang="fr-FR" dirty="0" smtClean="0"/>
-              <a:t>Mettre à jour ma branche locale avec un </a:t>
-            </a:r>
-            <a:r>
-              <a:rPr lang="fr-FR" dirty="0" err="1" smtClean="0"/>
-              <a:t>rebase</a:t>
-            </a:r>
-            <a:endParaRPr lang="fr-FR" dirty="0" smtClean="0"/>
-          </a:p>
-          <a:p>
-            <a:pPr lvl="1"/>
-            <a:r>
-              <a:rPr lang="fr-FR" dirty="0" smtClean="0"/>
-              <a:t>git </a:t>
-            </a:r>
-            <a:r>
-              <a:rPr lang="fr-FR" dirty="0" err="1" smtClean="0"/>
-              <a:t>checkout</a:t>
-            </a:r>
-            <a:r>
-              <a:rPr lang="fr-FR" dirty="0" smtClean="0"/>
-              <a:t> </a:t>
-            </a:r>
-            <a:r>
-              <a:rPr lang="fr-FR" dirty="0" err="1" smtClean="0"/>
-              <a:t>mabranche</a:t>
-            </a:r>
-            <a:r>
-              <a:rPr lang="fr-FR" dirty="0" smtClean="0"/>
-              <a:t> </a:t>
-            </a:r>
-          </a:p>
-          <a:p>
-            <a:pPr lvl="1"/>
-            <a:r>
-              <a:rPr lang="fr-FR" dirty="0"/>
-              <a:t>g</a:t>
-            </a:r>
-            <a:r>
-              <a:rPr lang="fr-FR" dirty="0" smtClean="0"/>
-              <a:t>it </a:t>
-            </a:r>
-            <a:r>
-              <a:rPr lang="fr-FR" dirty="0" err="1" smtClean="0"/>
-              <a:t>fetch</a:t>
-            </a:r>
-            <a:endParaRPr lang="fr-FR" dirty="0" smtClean="0"/>
-          </a:p>
-          <a:p>
-            <a:pPr lvl="1"/>
-            <a:r>
-              <a:rPr lang="fr-FR" dirty="0" smtClean="0"/>
-              <a:t>git </a:t>
-            </a:r>
-            <a:r>
-              <a:rPr lang="fr-FR" dirty="0" err="1" smtClean="0"/>
-              <a:t>rebase</a:t>
-            </a:r>
-            <a:r>
-              <a:rPr lang="fr-FR" dirty="0" smtClean="0"/>
-              <a:t> </a:t>
-            </a:r>
-            <a:r>
-              <a:rPr lang="fr-FR" dirty="0" err="1" smtClean="0"/>
-              <a:t>origin</a:t>
-            </a:r>
-            <a:r>
-              <a:rPr lang="fr-FR" dirty="0" smtClean="0"/>
-              <a:t> </a:t>
-            </a:r>
-            <a:r>
-              <a:rPr lang="fr-FR" dirty="0" err="1" smtClean="0"/>
-              <a:t>mabranche</a:t>
-            </a:r>
-            <a:endParaRPr lang="fr-FR" dirty="0" smtClean="0"/>
-          </a:p>
-          <a:p>
-            <a:pPr lvl="1"/>
-            <a:r>
-              <a:rPr lang="fr-FR" dirty="0" smtClean="0"/>
-              <a:t>En une commande: git pull --</a:t>
-            </a:r>
-            <a:r>
-              <a:rPr lang="fr-FR" dirty="0" err="1" smtClean="0"/>
-              <a:t>rebase</a:t>
-            </a:r>
-            <a:r>
-              <a:rPr lang="fr-FR" dirty="0" smtClean="0"/>
-              <a:t> </a:t>
-            </a:r>
-            <a:r>
-              <a:rPr lang="fr-FR" dirty="0" err="1" smtClean="0"/>
-              <a:t>origin</a:t>
-            </a:r>
-            <a:r>
-              <a:rPr lang="fr-FR" dirty="0" smtClean="0"/>
-              <a:t> </a:t>
-            </a:r>
-            <a:r>
-              <a:rPr lang="fr-FR" dirty="0" err="1" smtClean="0"/>
-              <a:t>mabranche</a:t>
-            </a:r>
-            <a:endParaRPr lang="fr-FR" dirty="0" smtClean="0"/>
-          </a:p>
-          <a:p>
-            <a:r>
-              <a:rPr lang="fr-FR" dirty="0" smtClean="0"/>
-              <a:t>Pas de réécriture de l’histoire</a:t>
-            </a:r>
-          </a:p>
-          <a:p>
-            <a:pPr lvl="1"/>
-            <a:r>
-              <a:rPr lang="fr-FR" dirty="0"/>
-              <a:t>g</a:t>
-            </a:r>
-            <a:r>
-              <a:rPr lang="fr-FR" dirty="0" smtClean="0"/>
-              <a:t>it push </a:t>
-            </a:r>
-            <a:r>
-              <a:rPr lang="fr-FR" dirty="0" err="1" smtClean="0"/>
-              <a:t>origin</a:t>
-            </a:r>
-            <a:r>
-              <a:rPr lang="fr-FR" dirty="0" smtClean="0"/>
-              <a:t> </a:t>
-            </a:r>
-            <a:r>
-              <a:rPr lang="fr-FR" dirty="0" err="1" smtClean="0"/>
-              <a:t>mabranche</a:t>
-            </a:r>
-            <a:endParaRPr lang="fr-FR" dirty="0" smtClean="0"/>
-          </a:p>
-          <a:p>
-            <a:pPr lvl="1"/>
-            <a:endParaRPr lang="fr-CH" dirty="0"/>
-          </a:p>
-        </p:txBody>
-      </p:sp>
-    </p:spTree>
-    <p:extLst>
-      <p:ext uri="{BB962C8B-B14F-4D97-AF65-F5344CB8AC3E}">
-        <p14:creationId xmlns:p14="http://schemas.microsoft.com/office/powerpoint/2010/main" val="1478987373"/>
       </p:ext>
     </p:extLst>
   </p:cSld>

</xml_diff>

<commit_message>
diapo supprime sans fiare expres
</commit_message>
<xml_diff>
--- a/Formation Git - avancée.pptx
+++ b/Formation Git - avancée.pptx
@@ -14,7 +14,7 @@
     <p:sldId id="300" r:id="rId2"/>
     <p:sldId id="283" r:id="rId3"/>
     <p:sldId id="284" r:id="rId4"/>
-    <p:sldId id="285" r:id="rId5"/>
+    <p:sldId id="301" r:id="rId5"/>
     <p:sldId id="286" r:id="rId6"/>
     <p:sldId id="287" r:id="rId7"/>
     <p:sldId id="288" r:id="rId8"/>
@@ -13154,7 +13154,6 @@
               <a:rPr lang="fr-CH" dirty="0"/>
               <a:t>Comprendre git pour l’utiliser encore mieux tous les jours</a:t>
             </a:r>
-            <a:endParaRPr lang="fr-CH" dirty="0"/>
           </a:p>
         </p:txBody>
       </p:sp>
@@ -18713,7 +18712,7 @@
           <a:p>
             <a:r>
               <a:rPr lang="fr-FR" dirty="0" smtClean="0"/>
-              <a:t>L’architecture</a:t>
+              <a:t>Les objets</a:t>
             </a:r>
             <a:endParaRPr lang="fr-CH" dirty="0"/>
           </a:p>
@@ -18731,99 +18730,179 @@
         </p:nvSpPr>
         <p:spPr>
           <a:xfrm>
-            <a:off x="950384" y="1555242"/>
-            <a:ext cx="10281992" cy="3619041"/>
+            <a:off x="950385" y="1211855"/>
+            <a:ext cx="10281992" cy="4825388"/>
           </a:xfrm>
         </p:spPr>
         <p:txBody>
           <a:bodyPr>
-            <a:normAutofit/>
+            <a:normAutofit fontScale="85000" lnSpcReduction="10000"/>
           </a:bodyPr>
           <a:lstStyle/>
           <a:p>
             <a:r>
               <a:rPr lang="fr-FR" dirty="0" smtClean="0"/>
-              <a:t>Le répertoire .git contient toutes les informations nécessaire au fonctionnement du </a:t>
-            </a:r>
+              <a:t>4 types</a:t>
+            </a:r>
+          </a:p>
+          <a:p>
+            <a:pPr lvl="1"/>
+            <a:r>
+              <a:rPr lang="fr-FR" dirty="0" smtClean="0"/>
+              <a:t>Commit</a:t>
+            </a:r>
+          </a:p>
+          <a:p>
+            <a:pPr lvl="1"/>
             <a:r>
               <a:rPr lang="fr-FR" dirty="0" err="1" smtClean="0"/>
-              <a:t>dépot</a:t>
-            </a:r>
+              <a:t>Tree</a:t>
+            </a:r>
+            <a:r>
+              <a:rPr lang="fr-FR" dirty="0" smtClean="0"/>
+              <a:t> -&gt; représente les répertoires</a:t>
+            </a:r>
+          </a:p>
+          <a:p>
+            <a:pPr lvl="1"/>
+            <a:r>
+              <a:rPr lang="fr-FR" dirty="0" smtClean="0"/>
+              <a:t>Blob -&gt; contient le contenu des fichiers</a:t>
+            </a:r>
+          </a:p>
+          <a:p>
+            <a:pPr lvl="1"/>
+            <a:r>
+              <a:rPr lang="fr-FR" dirty="0" smtClean="0"/>
+              <a:t>Tag -&gt; Permet de tagguer un commit</a:t>
+            </a:r>
+          </a:p>
+          <a:p>
+            <a:r>
+              <a:rPr lang="fr-FR" dirty="0"/>
+              <a:t>Chaque type d’objet contient au minimum: type, taille et </a:t>
+            </a:r>
+            <a:r>
+              <a:rPr lang="fr-FR" dirty="0" smtClean="0"/>
+              <a:t>contenu</a:t>
+            </a:r>
+          </a:p>
+          <a:p>
+            <a:r>
+              <a:rPr lang="fr-FR" dirty="0" smtClean="0"/>
+              <a:t>Tous les objets sont signé </a:t>
+            </a:r>
+            <a:r>
+              <a:rPr lang="fr-FR" dirty="0"/>
+              <a:t>par la fonction de </a:t>
+            </a:r>
+            <a:r>
+              <a:rPr lang="fr-FR" dirty="0" err="1"/>
+              <a:t>hashage</a:t>
+            </a:r>
+            <a:r>
+              <a:rPr lang="fr-FR" dirty="0"/>
+              <a:t> SHA-1</a:t>
+            </a:r>
+            <a:r>
+              <a:rPr lang="fr-FR" dirty="0" smtClean="0"/>
+              <a:t> se basant sur le contenu de l’objet</a:t>
+            </a:r>
+          </a:p>
+          <a:p>
+            <a:pPr lvl="1"/>
+            <a:r>
+              <a:rPr lang="fr-FR" dirty="0" smtClean="0"/>
+              <a:t>git </a:t>
+            </a:r>
+            <a:r>
+              <a:rPr lang="fr-FR" dirty="0"/>
+              <a:t>hash-</a:t>
+            </a:r>
+            <a:r>
+              <a:rPr lang="fr-FR" dirty="0" err="1"/>
+              <a:t>object</a:t>
+            </a:r>
+            <a:r>
+              <a:rPr lang="fr-FR" dirty="0"/>
+              <a:t> </a:t>
+            </a:r>
+            <a:r>
+              <a:rPr lang="fr-FR" dirty="0" smtClean="0"/>
+              <a:t>&lt;</a:t>
+            </a:r>
+            <a:r>
+              <a:rPr lang="fr-FR" dirty="0" err="1" smtClean="0"/>
+              <a:t>object-name</a:t>
+            </a:r>
+            <a:r>
+              <a:rPr lang="fr-FR" dirty="0" smtClean="0"/>
+              <a:t>&gt;</a:t>
+            </a:r>
+          </a:p>
+          <a:p>
+            <a:pPr lvl="1"/>
+            <a:r>
+              <a:rPr lang="fr-FR" dirty="0"/>
+              <a:t>Hash unique (chance de collision très faible</a:t>
+            </a:r>
+            <a:r>
+              <a:rPr lang="fr-FR" dirty="0" smtClean="0"/>
+              <a:t>)</a:t>
+            </a:r>
+          </a:p>
+          <a:p>
+            <a:pPr lvl="1"/>
+            <a:r>
+              <a:rPr lang="fr-FR" dirty="0" smtClean="0"/>
+              <a:t>Identité: permet de synchroniser les </a:t>
+            </a:r>
+            <a:r>
+              <a:rPr lang="fr-FR" dirty="0" err="1" smtClean="0"/>
+              <a:t>dépots</a:t>
+            </a:r>
+            <a:r>
+              <a:rPr lang="fr-FR" dirty="0" smtClean="0"/>
+              <a:t> entre eux</a:t>
+            </a:r>
+          </a:p>
+          <a:p>
+            <a:pPr lvl="1"/>
+            <a:r>
+              <a:rPr lang="fr-FR" dirty="0" smtClean="0"/>
+              <a:t>Intégrité</a:t>
+            </a:r>
+          </a:p>
+          <a:p>
+            <a:r>
+              <a:rPr lang="fr-FR" dirty="0" smtClean="0"/>
+              <a:t>Les objets sont immuables</a:t>
+            </a:r>
+          </a:p>
+          <a:p>
+            <a:r>
+              <a:rPr lang="fr-FR" dirty="0" smtClean="0"/>
+              <a:t>Ces objets sont liés entre eux sous forme d’un arbre dont la racine est un commit</a:t>
+            </a:r>
+          </a:p>
+          <a:p>
             <a:endParaRPr lang="fr-FR" dirty="0" smtClean="0"/>
           </a:p>
           <a:p>
-            <a:r>
-              <a:rPr lang="fr-FR" dirty="0" smtClean="0"/>
-              <a:t>Contient les répertoires suivants</a:t>
-            </a:r>
-          </a:p>
-          <a:p>
-            <a:pPr lvl="1"/>
-            <a:r>
-              <a:rPr lang="fr-FR" dirty="0" err="1" smtClean="0"/>
-              <a:t>Hooks</a:t>
-            </a:r>
-            <a:r>
-              <a:rPr lang="fr-FR" dirty="0" smtClean="0"/>
-              <a:t> -&gt; permet de stocker les scripts de </a:t>
-            </a:r>
-            <a:r>
-              <a:rPr lang="fr-FR" dirty="0" err="1" smtClean="0"/>
-              <a:t>hook</a:t>
-            </a:r>
             <a:endParaRPr lang="fr-FR" dirty="0" smtClean="0"/>
           </a:p>
           <a:p>
-            <a:pPr lvl="1"/>
-            <a:r>
-              <a:rPr lang="fr-FR" dirty="0" smtClean="0"/>
-              <a:t>Logs -&gt; logs des différentes opérations effectuées avec git</a:t>
-            </a:r>
-          </a:p>
-          <a:p>
-            <a:pPr lvl="1"/>
-            <a:r>
-              <a:rPr lang="fr-FR" dirty="0" err="1" smtClean="0"/>
-              <a:t>Objects</a:t>
-            </a:r>
-            <a:r>
-              <a:rPr lang="fr-FR" dirty="0" smtClean="0"/>
-              <a:t> -&gt; contient (entre autre) les </a:t>
-            </a:r>
-            <a:r>
-              <a:rPr lang="fr-FR" dirty="0" err="1" smtClean="0"/>
-              <a:t>commits</a:t>
-            </a:r>
-            <a:endParaRPr lang="fr-FR" dirty="0" smtClean="0"/>
-          </a:p>
-          <a:p>
-            <a:pPr lvl="1"/>
-            <a:r>
-              <a:rPr lang="fr-FR" dirty="0" err="1" smtClean="0"/>
-              <a:t>Refs</a:t>
-            </a:r>
-            <a:r>
-              <a:rPr lang="fr-FR" dirty="0" smtClean="0"/>
-              <a:t> -&gt; contient les étiquettes  </a:t>
-            </a:r>
-          </a:p>
-          <a:p>
-            <a:r>
-              <a:rPr lang="fr-CH" dirty="0" smtClean="0"/>
-              <a:t>Le fonctionnement interne de git est basé que sur les </a:t>
-            </a:r>
-            <a:r>
-              <a:rPr lang="fr-CH" dirty="0" err="1" smtClean="0"/>
-              <a:t>objects</a:t>
-            </a:r>
-            <a:endParaRPr lang="fr-FR" dirty="0"/>
+            <a:pPr marL="80962" indent="0">
+              <a:buNone/>
+            </a:pPr>
+            <a:endParaRPr lang="fr-CH" dirty="0"/>
           </a:p>
         </p:txBody>
       </p:sp>
     </p:spTree>
     <p:extLst>
       <p:ext uri="{BB962C8B-B14F-4D97-AF65-F5344CB8AC3E}">
-        <p14:creationId xmlns:p14="http://schemas.microsoft.com/office/powerpoint/2010/main" val="1697854684"/>
+        <p14:creationId xmlns:p14="http://schemas.microsoft.com/office/powerpoint/2010/main" val="1841240301"/>
       </p:ext>
     </p:extLst>
   </p:cSld>
@@ -19599,8 +19678,12 @@
               <a:t>Rebase</a:t>
             </a:r>
             <a:r>
-              <a:rPr lang="fr-FR" dirty="0" smtClean="0"/>
-              <a:t> non interactif</a:t>
+              <a:rPr lang="fr-FR" smtClean="0"/>
+              <a:t> </a:t>
+            </a:r>
+            <a:r>
+              <a:rPr lang="fr-FR" smtClean="0"/>
+              <a:t>(non interactif)</a:t>
             </a:r>
             <a:endParaRPr lang="fr-CH" dirty="0"/>
           </a:p>

</xml_diff>